<commit_message>
some small changes to get the code running for the presentation and also updateted the presentation text
</commit_message>
<xml_diff>
--- a/Presentation/Presentation.pptx
+++ b/Presentation/Presentation.pptx
@@ -2,20 +2,23 @@
 <file path=ppt/presentation.xml><?xml version="1.0" encoding="utf-8"?>
 <p:presentation xmlns:a="http://schemas.openxmlformats.org/drawingml/2006/main" xmlns:r="http://schemas.openxmlformats.org/officeDocument/2006/relationships" xmlns:p="http://schemas.openxmlformats.org/presentationml/2006/main" saveSubsetFonts="1">
   <p:sldMasterIdLst>
-    <p:sldMasterId id="2147483648" r:id="rId1"/>
+    <p:sldMasterId id="2147483708" r:id="rId1"/>
   </p:sldMasterIdLst>
   <p:sldIdLst>
     <p:sldId id="256" r:id="rId2"/>
-    <p:sldId id="258" r:id="rId3"/>
-    <p:sldId id="257" r:id="rId4"/>
+    <p:sldId id="259" r:id="rId3"/>
+    <p:sldId id="260" r:id="rId4"/>
+    <p:sldId id="257" r:id="rId5"/>
+    <p:sldId id="261" r:id="rId6"/>
+    <p:sldId id="262" r:id="rId7"/>
   </p:sldIdLst>
   <p:sldSz cx="12192000" cy="6858000"/>
   <p:notesSz cx="6858000" cy="9144000"/>
   <p:defaultTextStyle>
     <a:defPPr>
-      <a:defRPr lang="de-DE"/>
+      <a:defRPr lang="en-US"/>
     </a:defPPr>
-    <a:lvl1pPr marL="0" algn="l" defTabSz="914400" rtl="0" eaLnBrk="1" latinLnBrk="0" hangingPunct="1">
+    <a:lvl1pPr marL="0" algn="l" defTabSz="457200" rtl="0" eaLnBrk="1" latinLnBrk="0" hangingPunct="1">
       <a:defRPr sz="1800" kern="1200">
         <a:solidFill>
           <a:schemeClr val="tx1"/>
@@ -25,7 +28,7 @@
         <a:cs typeface="+mn-cs"/>
       </a:defRPr>
     </a:lvl1pPr>
-    <a:lvl2pPr marL="457200" algn="l" defTabSz="914400" rtl="0" eaLnBrk="1" latinLnBrk="0" hangingPunct="1">
+    <a:lvl2pPr marL="457200" algn="l" defTabSz="457200" rtl="0" eaLnBrk="1" latinLnBrk="0" hangingPunct="1">
       <a:defRPr sz="1800" kern="1200">
         <a:solidFill>
           <a:schemeClr val="tx1"/>
@@ -35,7 +38,7 @@
         <a:cs typeface="+mn-cs"/>
       </a:defRPr>
     </a:lvl2pPr>
-    <a:lvl3pPr marL="914400" algn="l" defTabSz="914400" rtl="0" eaLnBrk="1" latinLnBrk="0" hangingPunct="1">
+    <a:lvl3pPr marL="914400" algn="l" defTabSz="457200" rtl="0" eaLnBrk="1" latinLnBrk="0" hangingPunct="1">
       <a:defRPr sz="1800" kern="1200">
         <a:solidFill>
           <a:schemeClr val="tx1"/>
@@ -45,7 +48,7 @@
         <a:cs typeface="+mn-cs"/>
       </a:defRPr>
     </a:lvl3pPr>
-    <a:lvl4pPr marL="1371600" algn="l" defTabSz="914400" rtl="0" eaLnBrk="1" latinLnBrk="0" hangingPunct="1">
+    <a:lvl4pPr marL="1371600" algn="l" defTabSz="457200" rtl="0" eaLnBrk="1" latinLnBrk="0" hangingPunct="1">
       <a:defRPr sz="1800" kern="1200">
         <a:solidFill>
           <a:schemeClr val="tx1"/>
@@ -55,7 +58,7 @@
         <a:cs typeface="+mn-cs"/>
       </a:defRPr>
     </a:lvl4pPr>
-    <a:lvl5pPr marL="1828800" algn="l" defTabSz="914400" rtl="0" eaLnBrk="1" latinLnBrk="0" hangingPunct="1">
+    <a:lvl5pPr marL="1828800" algn="l" defTabSz="457200" rtl="0" eaLnBrk="1" latinLnBrk="0" hangingPunct="1">
       <a:defRPr sz="1800" kern="1200">
         <a:solidFill>
           <a:schemeClr val="tx1"/>
@@ -65,7 +68,7 @@
         <a:cs typeface="+mn-cs"/>
       </a:defRPr>
     </a:lvl5pPr>
-    <a:lvl6pPr marL="2286000" algn="l" defTabSz="914400" rtl="0" eaLnBrk="1" latinLnBrk="0" hangingPunct="1">
+    <a:lvl6pPr marL="2286000" algn="l" defTabSz="457200" rtl="0" eaLnBrk="1" latinLnBrk="0" hangingPunct="1">
       <a:defRPr sz="1800" kern="1200">
         <a:solidFill>
           <a:schemeClr val="tx1"/>
@@ -75,7 +78,7 @@
         <a:cs typeface="+mn-cs"/>
       </a:defRPr>
     </a:lvl6pPr>
-    <a:lvl7pPr marL="2743200" algn="l" defTabSz="914400" rtl="0" eaLnBrk="1" latinLnBrk="0" hangingPunct="1">
+    <a:lvl7pPr marL="2743200" algn="l" defTabSz="457200" rtl="0" eaLnBrk="1" latinLnBrk="0" hangingPunct="1">
       <a:defRPr sz="1800" kern="1200">
         <a:solidFill>
           <a:schemeClr val="tx1"/>
@@ -85,7 +88,7 @@
         <a:cs typeface="+mn-cs"/>
       </a:defRPr>
     </a:lvl7pPr>
-    <a:lvl8pPr marL="3200400" algn="l" defTabSz="914400" rtl="0" eaLnBrk="1" latinLnBrk="0" hangingPunct="1">
+    <a:lvl8pPr marL="3200400" algn="l" defTabSz="457200" rtl="0" eaLnBrk="1" latinLnBrk="0" hangingPunct="1">
       <a:defRPr sz="1800" kern="1200">
         <a:solidFill>
           <a:schemeClr val="tx1"/>
@@ -95,7 +98,7 @@
         <a:cs typeface="+mn-cs"/>
       </a:defRPr>
     </a:lvl8pPr>
-    <a:lvl9pPr marL="3657600" algn="l" defTabSz="914400" rtl="0" eaLnBrk="1" latinLnBrk="0" hangingPunct="1">
+    <a:lvl9pPr marL="3657600" algn="l" defTabSz="457200" rtl="0" eaLnBrk="1" latinLnBrk="0" hangingPunct="1">
       <a:defRPr sz="1800" kern="1200">
         <a:solidFill>
           <a:schemeClr val="tx1"/>
@@ -133,13 +136,7 @@
       </p:grpSpPr>
       <p:sp>
         <p:nvSpPr>
-          <p:cNvPr id="2" name="Titel 1">
-            <a:extLst>
-              <a:ext uri="{FF2B5EF4-FFF2-40B4-BE49-F238E27FC236}">
-                <a16:creationId xmlns:a16="http://schemas.microsoft.com/office/drawing/2014/main" id="{5E20F7D0-CB25-4634-9020-5C458A0A0C94}"/>
-              </a:ext>
-            </a:extLst>
-          </p:cNvPr>
+          <p:cNvPr id="2" name="Title 1"/>
           <p:cNvSpPr>
             <a:spLocks noGrp="1"/>
           </p:cNvSpPr>
@@ -165,18 +162,13 @@
               <a:rPr lang="de-DE"/>
               <a:t>Mastertitelformat bearbeiten</a:t>
             </a:r>
-          </a:p>
-        </p:txBody>
-      </p:sp>
-      <p:sp>
-        <p:nvSpPr>
-          <p:cNvPr id="3" name="Untertitel 2">
-            <a:extLst>
-              <a:ext uri="{FF2B5EF4-FFF2-40B4-BE49-F238E27FC236}">
-                <a16:creationId xmlns:a16="http://schemas.microsoft.com/office/drawing/2014/main" id="{F297D2E8-BDCC-4AE9-906C-8A977508E9AB}"/>
-              </a:ext>
-            </a:extLst>
-          </p:cNvPr>
+            <a:endParaRPr lang="en-US" dirty="0"/>
+          </a:p>
+        </p:txBody>
+      </p:sp>
+      <p:sp>
+        <p:nvSpPr>
+          <p:cNvPr id="3" name="Subtitle 2"/>
           <p:cNvSpPr>
             <a:spLocks noGrp="1"/>
           </p:cNvSpPr>
@@ -235,18 +227,13 @@
               <a:rPr lang="de-DE"/>
               <a:t>Master-Untertitelformat bearbeiten</a:t>
             </a:r>
-          </a:p>
-        </p:txBody>
-      </p:sp>
-      <p:sp>
-        <p:nvSpPr>
-          <p:cNvPr id="4" name="Datumsplatzhalter 3">
-            <a:extLst>
-              <a:ext uri="{FF2B5EF4-FFF2-40B4-BE49-F238E27FC236}">
-                <a16:creationId xmlns:a16="http://schemas.microsoft.com/office/drawing/2014/main" id="{F2356A78-FA7C-4F88-95FF-6E600C9FB079}"/>
-              </a:ext>
-            </a:extLst>
-          </p:cNvPr>
+            <a:endParaRPr lang="en-US" dirty="0"/>
+          </a:p>
+        </p:txBody>
+      </p:sp>
+      <p:sp>
+        <p:nvSpPr>
+          <p:cNvPr id="4" name="Date Placeholder 3"/>
           <p:cNvSpPr>
             <a:spLocks noGrp="1"/>
           </p:cNvSpPr>
@@ -261,7 +248,7 @@
           <a:p>
             <a:fld id="{736D181F-5524-47DD-B4BD-9A9A21FDF560}" type="datetimeFigureOut">
               <a:rPr lang="de-DE" smtClean="0"/>
-              <a:t>09.08.2021</a:t>
+              <a:t>11.08.2021</a:t>
             </a:fld>
             <a:endParaRPr lang="de-DE"/>
           </a:p>
@@ -269,13 +256,7 @@
       </p:sp>
       <p:sp>
         <p:nvSpPr>
-          <p:cNvPr id="5" name="Fußzeilenplatzhalter 4">
-            <a:extLst>
-              <a:ext uri="{FF2B5EF4-FFF2-40B4-BE49-F238E27FC236}">
-                <a16:creationId xmlns:a16="http://schemas.microsoft.com/office/drawing/2014/main" id="{6DA67981-3F8C-4941-B453-6F698C86A80C}"/>
-              </a:ext>
-            </a:extLst>
-          </p:cNvPr>
+          <p:cNvPr id="5" name="Footer Placeholder 4"/>
           <p:cNvSpPr>
             <a:spLocks noGrp="1"/>
           </p:cNvSpPr>
@@ -294,13 +275,7 @@
       </p:sp>
       <p:sp>
         <p:nvSpPr>
-          <p:cNvPr id="6" name="Foliennummernplatzhalter 5">
-            <a:extLst>
-              <a:ext uri="{FF2B5EF4-FFF2-40B4-BE49-F238E27FC236}">
-                <a16:creationId xmlns:a16="http://schemas.microsoft.com/office/drawing/2014/main" id="{F9E151B7-3666-4633-93F4-55F6B919015E}"/>
-              </a:ext>
-            </a:extLst>
-          </p:cNvPr>
+          <p:cNvPr id="6" name="Slide Number Placeholder 5"/>
           <p:cNvSpPr>
             <a:spLocks noGrp="1"/>
           </p:cNvSpPr>
@@ -324,7 +299,7 @@
     </p:spTree>
     <p:extLst>
       <p:ext uri="{BB962C8B-B14F-4D97-AF65-F5344CB8AC3E}">
-        <p14:creationId xmlns:p14="http://schemas.microsoft.com/office/powerpoint/2010/main" val="606578434"/>
+        <p14:creationId xmlns:p14="http://schemas.microsoft.com/office/powerpoint/2010/main" val="3053524551"/>
       </p:ext>
     </p:extLst>
   </p:cSld>
@@ -353,13 +328,7 @@
       </p:grpSpPr>
       <p:sp>
         <p:nvSpPr>
-          <p:cNvPr id="2" name="Titel 1">
-            <a:extLst>
-              <a:ext uri="{FF2B5EF4-FFF2-40B4-BE49-F238E27FC236}">
-                <a16:creationId xmlns:a16="http://schemas.microsoft.com/office/drawing/2014/main" id="{7B35B5C7-3FEC-43B0-9B18-47B11DF6F29F}"/>
-              </a:ext>
-            </a:extLst>
-          </p:cNvPr>
+          <p:cNvPr id="2" name="Title 1"/>
           <p:cNvSpPr>
             <a:spLocks noGrp="1"/>
           </p:cNvSpPr>
@@ -376,18 +345,13 @@
               <a:rPr lang="de-DE"/>
               <a:t>Mastertitelformat bearbeiten</a:t>
             </a:r>
-          </a:p>
-        </p:txBody>
-      </p:sp>
-      <p:sp>
-        <p:nvSpPr>
-          <p:cNvPr id="3" name="Vertikaler Textplatzhalter 2">
-            <a:extLst>
-              <a:ext uri="{FF2B5EF4-FFF2-40B4-BE49-F238E27FC236}">
-                <a16:creationId xmlns:a16="http://schemas.microsoft.com/office/drawing/2014/main" id="{133C46BB-8ED9-44DE-AC3A-81945A535417}"/>
-              </a:ext>
-            </a:extLst>
-          </p:cNvPr>
+            <a:endParaRPr lang="en-US" dirty="0"/>
+          </a:p>
+        </p:txBody>
+      </p:sp>
+      <p:sp>
+        <p:nvSpPr>
+          <p:cNvPr id="3" name="Vertical Text Placeholder 2"/>
           <p:cNvSpPr>
             <a:spLocks noGrp="1"/>
           </p:cNvSpPr>
@@ -433,18 +397,13 @@
               <a:rPr lang="de-DE"/>
               <a:t>Fünfte Ebene</a:t>
             </a:r>
-          </a:p>
-        </p:txBody>
-      </p:sp>
-      <p:sp>
-        <p:nvSpPr>
-          <p:cNvPr id="4" name="Datumsplatzhalter 3">
-            <a:extLst>
-              <a:ext uri="{FF2B5EF4-FFF2-40B4-BE49-F238E27FC236}">
-                <a16:creationId xmlns:a16="http://schemas.microsoft.com/office/drawing/2014/main" id="{5A9C84AE-4089-43EB-B3A1-A4E03F4B789A}"/>
-              </a:ext>
-            </a:extLst>
-          </p:cNvPr>
+            <a:endParaRPr lang="en-US" dirty="0"/>
+          </a:p>
+        </p:txBody>
+      </p:sp>
+      <p:sp>
+        <p:nvSpPr>
+          <p:cNvPr id="4" name="Date Placeholder 3"/>
           <p:cNvSpPr>
             <a:spLocks noGrp="1"/>
           </p:cNvSpPr>
@@ -459,7 +418,7 @@
           <a:p>
             <a:fld id="{736D181F-5524-47DD-B4BD-9A9A21FDF560}" type="datetimeFigureOut">
               <a:rPr lang="de-DE" smtClean="0"/>
-              <a:t>09.08.2021</a:t>
+              <a:t>11.08.2021</a:t>
             </a:fld>
             <a:endParaRPr lang="de-DE"/>
           </a:p>
@@ -467,13 +426,7 @@
       </p:sp>
       <p:sp>
         <p:nvSpPr>
-          <p:cNvPr id="5" name="Fußzeilenplatzhalter 4">
-            <a:extLst>
-              <a:ext uri="{FF2B5EF4-FFF2-40B4-BE49-F238E27FC236}">
-                <a16:creationId xmlns:a16="http://schemas.microsoft.com/office/drawing/2014/main" id="{2F28CD23-41A5-43DA-B342-C9F2EC5C3657}"/>
-              </a:ext>
-            </a:extLst>
-          </p:cNvPr>
+          <p:cNvPr id="5" name="Footer Placeholder 4"/>
           <p:cNvSpPr>
             <a:spLocks noGrp="1"/>
           </p:cNvSpPr>
@@ -492,13 +445,7 @@
       </p:sp>
       <p:sp>
         <p:nvSpPr>
-          <p:cNvPr id="6" name="Foliennummernplatzhalter 5">
-            <a:extLst>
-              <a:ext uri="{FF2B5EF4-FFF2-40B4-BE49-F238E27FC236}">
-                <a16:creationId xmlns:a16="http://schemas.microsoft.com/office/drawing/2014/main" id="{3348469F-91A6-4393-A8BF-AAC7E419DD0C}"/>
-              </a:ext>
-            </a:extLst>
-          </p:cNvPr>
+          <p:cNvPr id="6" name="Slide Number Placeholder 5"/>
           <p:cNvSpPr>
             <a:spLocks noGrp="1"/>
           </p:cNvSpPr>
@@ -522,7 +469,7 @@
     </p:spTree>
     <p:extLst>
       <p:ext uri="{BB962C8B-B14F-4D97-AF65-F5344CB8AC3E}">
-        <p14:creationId xmlns:p14="http://schemas.microsoft.com/office/powerpoint/2010/main" val="2800366400"/>
+        <p14:creationId xmlns:p14="http://schemas.microsoft.com/office/powerpoint/2010/main" val="2241453429"/>
       </p:ext>
     </p:extLst>
   </p:cSld>
@@ -551,13 +498,7 @@
       </p:grpSpPr>
       <p:sp>
         <p:nvSpPr>
-          <p:cNvPr id="2" name="Vertikaler Titel 1">
-            <a:extLst>
-              <a:ext uri="{FF2B5EF4-FFF2-40B4-BE49-F238E27FC236}">
-                <a16:creationId xmlns:a16="http://schemas.microsoft.com/office/drawing/2014/main" id="{052F20F5-BCC4-4B90-8BBE-7488D86F65F7}"/>
-              </a:ext>
-            </a:extLst>
-          </p:cNvPr>
+          <p:cNvPr id="2" name="Vertical Title 1"/>
           <p:cNvSpPr>
             <a:spLocks noGrp="1"/>
           </p:cNvSpPr>
@@ -579,18 +520,13 @@
               <a:rPr lang="de-DE"/>
               <a:t>Mastertitelformat bearbeiten</a:t>
             </a:r>
-          </a:p>
-        </p:txBody>
-      </p:sp>
-      <p:sp>
-        <p:nvSpPr>
-          <p:cNvPr id="3" name="Vertikaler Textplatzhalter 2">
-            <a:extLst>
-              <a:ext uri="{FF2B5EF4-FFF2-40B4-BE49-F238E27FC236}">
-                <a16:creationId xmlns:a16="http://schemas.microsoft.com/office/drawing/2014/main" id="{25F6EA77-A8C1-4C9C-9871-4807CB9D264B}"/>
-              </a:ext>
-            </a:extLst>
-          </p:cNvPr>
+            <a:endParaRPr lang="en-US" dirty="0"/>
+          </a:p>
+        </p:txBody>
+      </p:sp>
+      <p:sp>
+        <p:nvSpPr>
+          <p:cNvPr id="3" name="Vertical Text Placeholder 2"/>
           <p:cNvSpPr>
             <a:spLocks noGrp="1"/>
           </p:cNvSpPr>
@@ -641,18 +577,13 @@
               <a:rPr lang="de-DE"/>
               <a:t>Fünfte Ebene</a:t>
             </a:r>
-          </a:p>
-        </p:txBody>
-      </p:sp>
-      <p:sp>
-        <p:nvSpPr>
-          <p:cNvPr id="4" name="Datumsplatzhalter 3">
-            <a:extLst>
-              <a:ext uri="{FF2B5EF4-FFF2-40B4-BE49-F238E27FC236}">
-                <a16:creationId xmlns:a16="http://schemas.microsoft.com/office/drawing/2014/main" id="{4C83E5A1-F37D-482A-AC60-431812E92D42}"/>
-              </a:ext>
-            </a:extLst>
-          </p:cNvPr>
+            <a:endParaRPr lang="en-US" dirty="0"/>
+          </a:p>
+        </p:txBody>
+      </p:sp>
+      <p:sp>
+        <p:nvSpPr>
+          <p:cNvPr id="4" name="Date Placeholder 3"/>
           <p:cNvSpPr>
             <a:spLocks noGrp="1"/>
           </p:cNvSpPr>
@@ -667,7 +598,7 @@
           <a:p>
             <a:fld id="{736D181F-5524-47DD-B4BD-9A9A21FDF560}" type="datetimeFigureOut">
               <a:rPr lang="de-DE" smtClean="0"/>
-              <a:t>09.08.2021</a:t>
+              <a:t>11.08.2021</a:t>
             </a:fld>
             <a:endParaRPr lang="de-DE"/>
           </a:p>
@@ -675,13 +606,7 @@
       </p:sp>
       <p:sp>
         <p:nvSpPr>
-          <p:cNvPr id="5" name="Fußzeilenplatzhalter 4">
-            <a:extLst>
-              <a:ext uri="{FF2B5EF4-FFF2-40B4-BE49-F238E27FC236}">
-                <a16:creationId xmlns:a16="http://schemas.microsoft.com/office/drawing/2014/main" id="{DCBFBBE7-A28E-4388-884B-EE44DFBB28C6}"/>
-              </a:ext>
-            </a:extLst>
-          </p:cNvPr>
+          <p:cNvPr id="5" name="Footer Placeholder 4"/>
           <p:cNvSpPr>
             <a:spLocks noGrp="1"/>
           </p:cNvSpPr>
@@ -700,13 +625,7 @@
       </p:sp>
       <p:sp>
         <p:nvSpPr>
-          <p:cNvPr id="6" name="Foliennummernplatzhalter 5">
-            <a:extLst>
-              <a:ext uri="{FF2B5EF4-FFF2-40B4-BE49-F238E27FC236}">
-                <a16:creationId xmlns:a16="http://schemas.microsoft.com/office/drawing/2014/main" id="{853147F9-E185-4FBA-958C-2A65973D8332}"/>
-              </a:ext>
-            </a:extLst>
-          </p:cNvPr>
+          <p:cNvPr id="6" name="Slide Number Placeholder 5"/>
           <p:cNvSpPr>
             <a:spLocks noGrp="1"/>
           </p:cNvSpPr>
@@ -730,7 +649,7 @@
     </p:spTree>
     <p:extLst>
       <p:ext uri="{BB962C8B-B14F-4D97-AF65-F5344CB8AC3E}">
-        <p14:creationId xmlns:p14="http://schemas.microsoft.com/office/powerpoint/2010/main" val="3662166251"/>
+        <p14:creationId xmlns:p14="http://schemas.microsoft.com/office/powerpoint/2010/main" val="3951469548"/>
       </p:ext>
     </p:extLst>
   </p:cSld>
@@ -759,13 +678,7 @@
       </p:grpSpPr>
       <p:sp>
         <p:nvSpPr>
-          <p:cNvPr id="2" name="Titel 1">
-            <a:extLst>
-              <a:ext uri="{FF2B5EF4-FFF2-40B4-BE49-F238E27FC236}">
-                <a16:creationId xmlns:a16="http://schemas.microsoft.com/office/drawing/2014/main" id="{CA6F7C58-0161-4C16-BB63-D2005005E867}"/>
-              </a:ext>
-            </a:extLst>
-          </p:cNvPr>
+          <p:cNvPr id="2" name="Title 1"/>
           <p:cNvSpPr>
             <a:spLocks noGrp="1"/>
           </p:cNvSpPr>
@@ -782,18 +695,13 @@
               <a:rPr lang="de-DE"/>
               <a:t>Mastertitelformat bearbeiten</a:t>
             </a:r>
-          </a:p>
-        </p:txBody>
-      </p:sp>
-      <p:sp>
-        <p:nvSpPr>
-          <p:cNvPr id="3" name="Inhaltsplatzhalter 2">
-            <a:extLst>
-              <a:ext uri="{FF2B5EF4-FFF2-40B4-BE49-F238E27FC236}">
-                <a16:creationId xmlns:a16="http://schemas.microsoft.com/office/drawing/2014/main" id="{F6A3FE6D-D0FA-448E-B453-472E7DBCBC34}"/>
-              </a:ext>
-            </a:extLst>
-          </p:cNvPr>
+            <a:endParaRPr lang="en-US" dirty="0"/>
+          </a:p>
+        </p:txBody>
+      </p:sp>
+      <p:sp>
+        <p:nvSpPr>
+          <p:cNvPr id="3" name="Content Placeholder 2"/>
           <p:cNvSpPr>
             <a:spLocks noGrp="1"/>
           </p:cNvSpPr>
@@ -839,18 +747,13 @@
               <a:rPr lang="de-DE"/>
               <a:t>Fünfte Ebene</a:t>
             </a:r>
-          </a:p>
-        </p:txBody>
-      </p:sp>
-      <p:sp>
-        <p:nvSpPr>
-          <p:cNvPr id="4" name="Datumsplatzhalter 3">
-            <a:extLst>
-              <a:ext uri="{FF2B5EF4-FFF2-40B4-BE49-F238E27FC236}">
-                <a16:creationId xmlns:a16="http://schemas.microsoft.com/office/drawing/2014/main" id="{92F98B51-0901-49FE-B6FD-31D57B2A5784}"/>
-              </a:ext>
-            </a:extLst>
-          </p:cNvPr>
+            <a:endParaRPr lang="en-US" dirty="0"/>
+          </a:p>
+        </p:txBody>
+      </p:sp>
+      <p:sp>
+        <p:nvSpPr>
+          <p:cNvPr id="4" name="Date Placeholder 3"/>
           <p:cNvSpPr>
             <a:spLocks noGrp="1"/>
           </p:cNvSpPr>
@@ -865,7 +768,7 @@
           <a:p>
             <a:fld id="{736D181F-5524-47DD-B4BD-9A9A21FDF560}" type="datetimeFigureOut">
               <a:rPr lang="de-DE" smtClean="0"/>
-              <a:t>09.08.2021</a:t>
+              <a:t>11.08.2021</a:t>
             </a:fld>
             <a:endParaRPr lang="de-DE"/>
           </a:p>
@@ -873,13 +776,7 @@
       </p:sp>
       <p:sp>
         <p:nvSpPr>
-          <p:cNvPr id="5" name="Fußzeilenplatzhalter 4">
-            <a:extLst>
-              <a:ext uri="{FF2B5EF4-FFF2-40B4-BE49-F238E27FC236}">
-                <a16:creationId xmlns:a16="http://schemas.microsoft.com/office/drawing/2014/main" id="{CDD51D5D-C311-418A-85A8-BBA170378467}"/>
-              </a:ext>
-            </a:extLst>
-          </p:cNvPr>
+          <p:cNvPr id="5" name="Footer Placeholder 4"/>
           <p:cNvSpPr>
             <a:spLocks noGrp="1"/>
           </p:cNvSpPr>
@@ -898,13 +795,7 @@
       </p:sp>
       <p:sp>
         <p:nvSpPr>
-          <p:cNvPr id="6" name="Foliennummernplatzhalter 5">
-            <a:extLst>
-              <a:ext uri="{FF2B5EF4-FFF2-40B4-BE49-F238E27FC236}">
-                <a16:creationId xmlns:a16="http://schemas.microsoft.com/office/drawing/2014/main" id="{9D1B42AC-928A-435D-AE67-951F464E94C3}"/>
-              </a:ext>
-            </a:extLst>
-          </p:cNvPr>
+          <p:cNvPr id="6" name="Slide Number Placeholder 5"/>
           <p:cNvSpPr>
             <a:spLocks noGrp="1"/>
           </p:cNvSpPr>
@@ -928,7 +819,7 @@
     </p:spTree>
     <p:extLst>
       <p:ext uri="{BB962C8B-B14F-4D97-AF65-F5344CB8AC3E}">
-        <p14:creationId xmlns:p14="http://schemas.microsoft.com/office/powerpoint/2010/main" val="2563305084"/>
+        <p14:creationId xmlns:p14="http://schemas.microsoft.com/office/powerpoint/2010/main" val="22022063"/>
       </p:ext>
     </p:extLst>
   </p:cSld>
@@ -957,13 +848,7 @@
       </p:grpSpPr>
       <p:sp>
         <p:nvSpPr>
-          <p:cNvPr id="2" name="Titel 1">
-            <a:extLst>
-              <a:ext uri="{FF2B5EF4-FFF2-40B4-BE49-F238E27FC236}">
-                <a16:creationId xmlns:a16="http://schemas.microsoft.com/office/drawing/2014/main" id="{344C2FF7-FCF1-41E4-9F5E-6D17854CE574}"/>
-              </a:ext>
-            </a:extLst>
-          </p:cNvPr>
+          <p:cNvPr id="2" name="Title 1"/>
           <p:cNvSpPr>
             <a:spLocks noGrp="1"/>
           </p:cNvSpPr>
@@ -989,18 +874,13 @@
               <a:rPr lang="de-DE"/>
               <a:t>Mastertitelformat bearbeiten</a:t>
             </a:r>
-          </a:p>
-        </p:txBody>
-      </p:sp>
-      <p:sp>
-        <p:nvSpPr>
-          <p:cNvPr id="3" name="Textplatzhalter 2">
-            <a:extLst>
-              <a:ext uri="{FF2B5EF4-FFF2-40B4-BE49-F238E27FC236}">
-                <a16:creationId xmlns:a16="http://schemas.microsoft.com/office/drawing/2014/main" id="{9F8397E9-886A-429C-9030-78393CE86D4D}"/>
-              </a:ext>
-            </a:extLst>
-          </p:cNvPr>
+            <a:endParaRPr lang="en-US" dirty="0"/>
+          </a:p>
+        </p:txBody>
+      </p:sp>
+      <p:sp>
+        <p:nvSpPr>
+          <p:cNvPr id="3" name="Text Placeholder 2"/>
           <p:cNvSpPr>
             <a:spLocks noGrp="1"/>
           </p:cNvSpPr>
@@ -1119,13 +999,7 @@
       </p:sp>
       <p:sp>
         <p:nvSpPr>
-          <p:cNvPr id="4" name="Datumsplatzhalter 3">
-            <a:extLst>
-              <a:ext uri="{FF2B5EF4-FFF2-40B4-BE49-F238E27FC236}">
-                <a16:creationId xmlns:a16="http://schemas.microsoft.com/office/drawing/2014/main" id="{0B49DF01-2B1A-4800-BCC4-D1FD13A5D985}"/>
-              </a:ext>
-            </a:extLst>
-          </p:cNvPr>
+          <p:cNvPr id="4" name="Date Placeholder 3"/>
           <p:cNvSpPr>
             <a:spLocks noGrp="1"/>
           </p:cNvSpPr>
@@ -1140,7 +1014,7 @@
           <a:p>
             <a:fld id="{736D181F-5524-47DD-B4BD-9A9A21FDF560}" type="datetimeFigureOut">
               <a:rPr lang="de-DE" smtClean="0"/>
-              <a:t>09.08.2021</a:t>
+              <a:t>11.08.2021</a:t>
             </a:fld>
             <a:endParaRPr lang="de-DE"/>
           </a:p>
@@ -1148,13 +1022,7 @@
       </p:sp>
       <p:sp>
         <p:nvSpPr>
-          <p:cNvPr id="5" name="Fußzeilenplatzhalter 4">
-            <a:extLst>
-              <a:ext uri="{FF2B5EF4-FFF2-40B4-BE49-F238E27FC236}">
-                <a16:creationId xmlns:a16="http://schemas.microsoft.com/office/drawing/2014/main" id="{20727D88-1080-4F75-9782-11B6E42C5AB4}"/>
-              </a:ext>
-            </a:extLst>
-          </p:cNvPr>
+          <p:cNvPr id="5" name="Footer Placeholder 4"/>
           <p:cNvSpPr>
             <a:spLocks noGrp="1"/>
           </p:cNvSpPr>
@@ -1173,13 +1041,7 @@
       </p:sp>
       <p:sp>
         <p:nvSpPr>
-          <p:cNvPr id="6" name="Foliennummernplatzhalter 5">
-            <a:extLst>
-              <a:ext uri="{FF2B5EF4-FFF2-40B4-BE49-F238E27FC236}">
-                <a16:creationId xmlns:a16="http://schemas.microsoft.com/office/drawing/2014/main" id="{DE8A9DC6-B4AA-4979-82E1-E225455F997F}"/>
-              </a:ext>
-            </a:extLst>
-          </p:cNvPr>
+          <p:cNvPr id="6" name="Slide Number Placeholder 5"/>
           <p:cNvSpPr>
             <a:spLocks noGrp="1"/>
           </p:cNvSpPr>
@@ -1203,7 +1065,7 @@
     </p:spTree>
     <p:extLst>
       <p:ext uri="{BB962C8B-B14F-4D97-AF65-F5344CB8AC3E}">
-        <p14:creationId xmlns:p14="http://schemas.microsoft.com/office/powerpoint/2010/main" val="761498726"/>
+        <p14:creationId xmlns:p14="http://schemas.microsoft.com/office/powerpoint/2010/main" val="2039204111"/>
       </p:ext>
     </p:extLst>
   </p:cSld>
@@ -1232,13 +1094,7 @@
       </p:grpSpPr>
       <p:sp>
         <p:nvSpPr>
-          <p:cNvPr id="2" name="Titel 1">
-            <a:extLst>
-              <a:ext uri="{FF2B5EF4-FFF2-40B4-BE49-F238E27FC236}">
-                <a16:creationId xmlns:a16="http://schemas.microsoft.com/office/drawing/2014/main" id="{FF87883B-46A4-41E0-999D-886F818A9A00}"/>
-              </a:ext>
-            </a:extLst>
-          </p:cNvPr>
+          <p:cNvPr id="2" name="Title 1"/>
           <p:cNvSpPr>
             <a:spLocks noGrp="1"/>
           </p:cNvSpPr>
@@ -1255,18 +1111,13 @@
               <a:rPr lang="de-DE"/>
               <a:t>Mastertitelformat bearbeiten</a:t>
             </a:r>
-          </a:p>
-        </p:txBody>
-      </p:sp>
-      <p:sp>
-        <p:nvSpPr>
-          <p:cNvPr id="3" name="Inhaltsplatzhalter 2">
-            <a:extLst>
-              <a:ext uri="{FF2B5EF4-FFF2-40B4-BE49-F238E27FC236}">
-                <a16:creationId xmlns:a16="http://schemas.microsoft.com/office/drawing/2014/main" id="{FE9ECF4E-AB6D-455B-87AD-4CCEA30160A2}"/>
-              </a:ext>
-            </a:extLst>
-          </p:cNvPr>
+            <a:endParaRPr lang="en-US" dirty="0"/>
+          </a:p>
+        </p:txBody>
+      </p:sp>
+      <p:sp>
+        <p:nvSpPr>
+          <p:cNvPr id="3" name="Content Placeholder 2"/>
           <p:cNvSpPr>
             <a:spLocks noGrp="1"/>
           </p:cNvSpPr>
@@ -1317,18 +1168,13 @@
               <a:rPr lang="de-DE"/>
               <a:t>Fünfte Ebene</a:t>
             </a:r>
-          </a:p>
-        </p:txBody>
-      </p:sp>
-      <p:sp>
-        <p:nvSpPr>
-          <p:cNvPr id="4" name="Inhaltsplatzhalter 3">
-            <a:extLst>
-              <a:ext uri="{FF2B5EF4-FFF2-40B4-BE49-F238E27FC236}">
-                <a16:creationId xmlns:a16="http://schemas.microsoft.com/office/drawing/2014/main" id="{6612D073-A669-4F60-AE0E-F1A50CBA05AD}"/>
-              </a:ext>
-            </a:extLst>
-          </p:cNvPr>
+            <a:endParaRPr lang="en-US" dirty="0"/>
+          </a:p>
+        </p:txBody>
+      </p:sp>
+      <p:sp>
+        <p:nvSpPr>
+          <p:cNvPr id="4" name="Content Placeholder 3"/>
           <p:cNvSpPr>
             <a:spLocks noGrp="1"/>
           </p:cNvSpPr>
@@ -1379,18 +1225,13 @@
               <a:rPr lang="de-DE"/>
               <a:t>Fünfte Ebene</a:t>
             </a:r>
-          </a:p>
-        </p:txBody>
-      </p:sp>
-      <p:sp>
-        <p:nvSpPr>
-          <p:cNvPr id="5" name="Datumsplatzhalter 4">
-            <a:extLst>
-              <a:ext uri="{FF2B5EF4-FFF2-40B4-BE49-F238E27FC236}">
-                <a16:creationId xmlns:a16="http://schemas.microsoft.com/office/drawing/2014/main" id="{AB7584FC-7DD0-4CB3-855F-C3C5F237F6CD}"/>
-              </a:ext>
-            </a:extLst>
-          </p:cNvPr>
+            <a:endParaRPr lang="en-US" dirty="0"/>
+          </a:p>
+        </p:txBody>
+      </p:sp>
+      <p:sp>
+        <p:nvSpPr>
+          <p:cNvPr id="5" name="Date Placeholder 4"/>
           <p:cNvSpPr>
             <a:spLocks noGrp="1"/>
           </p:cNvSpPr>
@@ -1405,7 +1246,7 @@
           <a:p>
             <a:fld id="{736D181F-5524-47DD-B4BD-9A9A21FDF560}" type="datetimeFigureOut">
               <a:rPr lang="de-DE" smtClean="0"/>
-              <a:t>09.08.2021</a:t>
+              <a:t>11.08.2021</a:t>
             </a:fld>
             <a:endParaRPr lang="de-DE"/>
           </a:p>
@@ -1413,13 +1254,7 @@
       </p:sp>
       <p:sp>
         <p:nvSpPr>
-          <p:cNvPr id="6" name="Fußzeilenplatzhalter 5">
-            <a:extLst>
-              <a:ext uri="{FF2B5EF4-FFF2-40B4-BE49-F238E27FC236}">
-                <a16:creationId xmlns:a16="http://schemas.microsoft.com/office/drawing/2014/main" id="{12435FF9-C405-4217-A5BF-CA9A3CD8878D}"/>
-              </a:ext>
-            </a:extLst>
-          </p:cNvPr>
+          <p:cNvPr id="6" name="Footer Placeholder 5"/>
           <p:cNvSpPr>
             <a:spLocks noGrp="1"/>
           </p:cNvSpPr>
@@ -1438,13 +1273,7 @@
       </p:sp>
       <p:sp>
         <p:nvSpPr>
-          <p:cNvPr id="7" name="Foliennummernplatzhalter 6">
-            <a:extLst>
-              <a:ext uri="{FF2B5EF4-FFF2-40B4-BE49-F238E27FC236}">
-                <a16:creationId xmlns:a16="http://schemas.microsoft.com/office/drawing/2014/main" id="{0C01A0F4-8C9B-47D0-877F-5CCBE3E5A3F0}"/>
-              </a:ext>
-            </a:extLst>
-          </p:cNvPr>
+          <p:cNvPr id="7" name="Slide Number Placeholder 6"/>
           <p:cNvSpPr>
             <a:spLocks noGrp="1"/>
           </p:cNvSpPr>
@@ -1468,7 +1297,7 @@
     </p:spTree>
     <p:extLst>
       <p:ext uri="{BB962C8B-B14F-4D97-AF65-F5344CB8AC3E}">
-        <p14:creationId xmlns:p14="http://schemas.microsoft.com/office/powerpoint/2010/main" val="1176762082"/>
+        <p14:creationId xmlns:p14="http://schemas.microsoft.com/office/powerpoint/2010/main" val="3939378553"/>
       </p:ext>
     </p:extLst>
   </p:cSld>
@@ -1497,13 +1326,7 @@
       </p:grpSpPr>
       <p:sp>
         <p:nvSpPr>
-          <p:cNvPr id="2" name="Titel 1">
-            <a:extLst>
-              <a:ext uri="{FF2B5EF4-FFF2-40B4-BE49-F238E27FC236}">
-                <a16:creationId xmlns:a16="http://schemas.microsoft.com/office/drawing/2014/main" id="{737B015F-8BA5-460D-B4BC-9EAF101EF32C}"/>
-              </a:ext>
-            </a:extLst>
-          </p:cNvPr>
+          <p:cNvPr id="2" name="Title 1"/>
           <p:cNvSpPr>
             <a:spLocks noGrp="1"/>
           </p:cNvSpPr>
@@ -1525,18 +1348,13 @@
               <a:rPr lang="de-DE"/>
               <a:t>Mastertitelformat bearbeiten</a:t>
             </a:r>
-          </a:p>
-        </p:txBody>
-      </p:sp>
-      <p:sp>
-        <p:nvSpPr>
-          <p:cNvPr id="3" name="Textplatzhalter 2">
-            <a:extLst>
-              <a:ext uri="{FF2B5EF4-FFF2-40B4-BE49-F238E27FC236}">
-                <a16:creationId xmlns:a16="http://schemas.microsoft.com/office/drawing/2014/main" id="{7061D5BE-5D36-4B90-8F4B-3EFCC7888122}"/>
-              </a:ext>
-            </a:extLst>
-          </p:cNvPr>
+            <a:endParaRPr lang="en-US" dirty="0"/>
+          </a:p>
+        </p:txBody>
+      </p:sp>
+      <p:sp>
+        <p:nvSpPr>
+          <p:cNvPr id="3" name="Text Placeholder 2"/>
           <p:cNvSpPr>
             <a:spLocks noGrp="1"/>
           </p:cNvSpPr>
@@ -1601,13 +1419,7 @@
       </p:sp>
       <p:sp>
         <p:nvSpPr>
-          <p:cNvPr id="4" name="Inhaltsplatzhalter 3">
-            <a:extLst>
-              <a:ext uri="{FF2B5EF4-FFF2-40B4-BE49-F238E27FC236}">
-                <a16:creationId xmlns:a16="http://schemas.microsoft.com/office/drawing/2014/main" id="{D7E16256-C095-4162-B5DC-8E05953C3FDC}"/>
-              </a:ext>
-            </a:extLst>
-          </p:cNvPr>
+          <p:cNvPr id="4" name="Content Placeholder 3"/>
           <p:cNvSpPr>
             <a:spLocks noGrp="1"/>
           </p:cNvSpPr>
@@ -1658,18 +1470,13 @@
               <a:rPr lang="de-DE"/>
               <a:t>Fünfte Ebene</a:t>
             </a:r>
-          </a:p>
-        </p:txBody>
-      </p:sp>
-      <p:sp>
-        <p:nvSpPr>
-          <p:cNvPr id="5" name="Textplatzhalter 4">
-            <a:extLst>
-              <a:ext uri="{FF2B5EF4-FFF2-40B4-BE49-F238E27FC236}">
-                <a16:creationId xmlns:a16="http://schemas.microsoft.com/office/drawing/2014/main" id="{47B24459-2E0E-4E60-A2D3-A5709EF4A521}"/>
-              </a:ext>
-            </a:extLst>
-          </p:cNvPr>
+            <a:endParaRPr lang="en-US" dirty="0"/>
+          </a:p>
+        </p:txBody>
+      </p:sp>
+      <p:sp>
+        <p:nvSpPr>
+          <p:cNvPr id="5" name="Text Placeholder 4"/>
           <p:cNvSpPr>
             <a:spLocks noGrp="1"/>
           </p:cNvSpPr>
@@ -1734,13 +1541,7 @@
       </p:sp>
       <p:sp>
         <p:nvSpPr>
-          <p:cNvPr id="6" name="Inhaltsplatzhalter 5">
-            <a:extLst>
-              <a:ext uri="{FF2B5EF4-FFF2-40B4-BE49-F238E27FC236}">
-                <a16:creationId xmlns:a16="http://schemas.microsoft.com/office/drawing/2014/main" id="{B4F5660E-8874-4C5F-BFD5-E65C5CAEB7CC}"/>
-              </a:ext>
-            </a:extLst>
-          </p:cNvPr>
+          <p:cNvPr id="6" name="Content Placeholder 5"/>
           <p:cNvSpPr>
             <a:spLocks noGrp="1"/>
           </p:cNvSpPr>
@@ -1791,18 +1592,13 @@
               <a:rPr lang="de-DE"/>
               <a:t>Fünfte Ebene</a:t>
             </a:r>
-          </a:p>
-        </p:txBody>
-      </p:sp>
-      <p:sp>
-        <p:nvSpPr>
-          <p:cNvPr id="7" name="Datumsplatzhalter 6">
-            <a:extLst>
-              <a:ext uri="{FF2B5EF4-FFF2-40B4-BE49-F238E27FC236}">
-                <a16:creationId xmlns:a16="http://schemas.microsoft.com/office/drawing/2014/main" id="{EE192EDD-28C1-4835-83FB-17E6593304E6}"/>
-              </a:ext>
-            </a:extLst>
-          </p:cNvPr>
+            <a:endParaRPr lang="en-US" dirty="0"/>
+          </a:p>
+        </p:txBody>
+      </p:sp>
+      <p:sp>
+        <p:nvSpPr>
+          <p:cNvPr id="7" name="Date Placeholder 6"/>
           <p:cNvSpPr>
             <a:spLocks noGrp="1"/>
           </p:cNvSpPr>
@@ -1817,7 +1613,7 @@
           <a:p>
             <a:fld id="{736D181F-5524-47DD-B4BD-9A9A21FDF560}" type="datetimeFigureOut">
               <a:rPr lang="de-DE" smtClean="0"/>
-              <a:t>09.08.2021</a:t>
+              <a:t>11.08.2021</a:t>
             </a:fld>
             <a:endParaRPr lang="de-DE"/>
           </a:p>
@@ -1825,13 +1621,7 @@
       </p:sp>
       <p:sp>
         <p:nvSpPr>
-          <p:cNvPr id="8" name="Fußzeilenplatzhalter 7">
-            <a:extLst>
-              <a:ext uri="{FF2B5EF4-FFF2-40B4-BE49-F238E27FC236}">
-                <a16:creationId xmlns:a16="http://schemas.microsoft.com/office/drawing/2014/main" id="{8702CAC9-5CD4-4670-882E-55EA2953EDC0}"/>
-              </a:ext>
-            </a:extLst>
-          </p:cNvPr>
+          <p:cNvPr id="8" name="Footer Placeholder 7"/>
           <p:cNvSpPr>
             <a:spLocks noGrp="1"/>
           </p:cNvSpPr>
@@ -1850,13 +1640,7 @@
       </p:sp>
       <p:sp>
         <p:nvSpPr>
-          <p:cNvPr id="9" name="Foliennummernplatzhalter 8">
-            <a:extLst>
-              <a:ext uri="{FF2B5EF4-FFF2-40B4-BE49-F238E27FC236}">
-                <a16:creationId xmlns:a16="http://schemas.microsoft.com/office/drawing/2014/main" id="{F46C56F7-56F5-4710-9144-462548F83735}"/>
-              </a:ext>
-            </a:extLst>
-          </p:cNvPr>
+          <p:cNvPr id="9" name="Slide Number Placeholder 8"/>
           <p:cNvSpPr>
             <a:spLocks noGrp="1"/>
           </p:cNvSpPr>
@@ -1880,7 +1664,7 @@
     </p:spTree>
     <p:extLst>
       <p:ext uri="{BB962C8B-B14F-4D97-AF65-F5344CB8AC3E}">
-        <p14:creationId xmlns:p14="http://schemas.microsoft.com/office/powerpoint/2010/main" val="90417435"/>
+        <p14:creationId xmlns:p14="http://schemas.microsoft.com/office/powerpoint/2010/main" val="3406155050"/>
       </p:ext>
     </p:extLst>
   </p:cSld>
@@ -1909,13 +1693,7 @@
       </p:grpSpPr>
       <p:sp>
         <p:nvSpPr>
-          <p:cNvPr id="2" name="Titel 1">
-            <a:extLst>
-              <a:ext uri="{FF2B5EF4-FFF2-40B4-BE49-F238E27FC236}">
-                <a16:creationId xmlns:a16="http://schemas.microsoft.com/office/drawing/2014/main" id="{FA9B0A79-F0E2-45B7-800B-FC872D5905A1}"/>
-              </a:ext>
-            </a:extLst>
-          </p:cNvPr>
+          <p:cNvPr id="2" name="Title 1"/>
           <p:cNvSpPr>
             <a:spLocks noGrp="1"/>
           </p:cNvSpPr>
@@ -1932,18 +1710,13 @@
               <a:rPr lang="de-DE"/>
               <a:t>Mastertitelformat bearbeiten</a:t>
             </a:r>
-          </a:p>
-        </p:txBody>
-      </p:sp>
-      <p:sp>
-        <p:nvSpPr>
-          <p:cNvPr id="3" name="Datumsplatzhalter 2">
-            <a:extLst>
-              <a:ext uri="{FF2B5EF4-FFF2-40B4-BE49-F238E27FC236}">
-                <a16:creationId xmlns:a16="http://schemas.microsoft.com/office/drawing/2014/main" id="{608E2208-2F42-4757-8702-8BCBDE82F9E2}"/>
-              </a:ext>
-            </a:extLst>
-          </p:cNvPr>
+            <a:endParaRPr lang="en-US" dirty="0"/>
+          </a:p>
+        </p:txBody>
+      </p:sp>
+      <p:sp>
+        <p:nvSpPr>
+          <p:cNvPr id="3" name="Date Placeholder 2"/>
           <p:cNvSpPr>
             <a:spLocks noGrp="1"/>
           </p:cNvSpPr>
@@ -1958,7 +1731,7 @@
           <a:p>
             <a:fld id="{736D181F-5524-47DD-B4BD-9A9A21FDF560}" type="datetimeFigureOut">
               <a:rPr lang="de-DE" smtClean="0"/>
-              <a:t>09.08.2021</a:t>
+              <a:t>11.08.2021</a:t>
             </a:fld>
             <a:endParaRPr lang="de-DE"/>
           </a:p>
@@ -1966,13 +1739,7 @@
       </p:sp>
       <p:sp>
         <p:nvSpPr>
-          <p:cNvPr id="4" name="Fußzeilenplatzhalter 3">
-            <a:extLst>
-              <a:ext uri="{FF2B5EF4-FFF2-40B4-BE49-F238E27FC236}">
-                <a16:creationId xmlns:a16="http://schemas.microsoft.com/office/drawing/2014/main" id="{AC7AD473-0D9E-4AC7-90D9-1931B7C7A282}"/>
-              </a:ext>
-            </a:extLst>
-          </p:cNvPr>
+          <p:cNvPr id="4" name="Footer Placeholder 3"/>
           <p:cNvSpPr>
             <a:spLocks noGrp="1"/>
           </p:cNvSpPr>
@@ -1991,13 +1758,7 @@
       </p:sp>
       <p:sp>
         <p:nvSpPr>
-          <p:cNvPr id="5" name="Foliennummernplatzhalter 4">
-            <a:extLst>
-              <a:ext uri="{FF2B5EF4-FFF2-40B4-BE49-F238E27FC236}">
-                <a16:creationId xmlns:a16="http://schemas.microsoft.com/office/drawing/2014/main" id="{D20298AF-C4E6-4910-885B-60DF65FFA101}"/>
-              </a:ext>
-            </a:extLst>
-          </p:cNvPr>
+          <p:cNvPr id="5" name="Slide Number Placeholder 4"/>
           <p:cNvSpPr>
             <a:spLocks noGrp="1"/>
           </p:cNvSpPr>
@@ -2021,7 +1782,7 @@
     </p:spTree>
     <p:extLst>
       <p:ext uri="{BB962C8B-B14F-4D97-AF65-F5344CB8AC3E}">
-        <p14:creationId xmlns:p14="http://schemas.microsoft.com/office/powerpoint/2010/main" val="3216137772"/>
+        <p14:creationId xmlns:p14="http://schemas.microsoft.com/office/powerpoint/2010/main" val="32915584"/>
       </p:ext>
     </p:extLst>
   </p:cSld>
@@ -2050,13 +1811,7 @@
       </p:grpSpPr>
       <p:sp>
         <p:nvSpPr>
-          <p:cNvPr id="2" name="Datumsplatzhalter 1">
-            <a:extLst>
-              <a:ext uri="{FF2B5EF4-FFF2-40B4-BE49-F238E27FC236}">
-                <a16:creationId xmlns:a16="http://schemas.microsoft.com/office/drawing/2014/main" id="{8943A70D-7E95-46A6-A19A-81D669E5599C}"/>
-              </a:ext>
-            </a:extLst>
-          </p:cNvPr>
+          <p:cNvPr id="2" name="Date Placeholder 1"/>
           <p:cNvSpPr>
             <a:spLocks noGrp="1"/>
           </p:cNvSpPr>
@@ -2071,7 +1826,7 @@
           <a:p>
             <a:fld id="{736D181F-5524-47DD-B4BD-9A9A21FDF560}" type="datetimeFigureOut">
               <a:rPr lang="de-DE" smtClean="0"/>
-              <a:t>09.08.2021</a:t>
+              <a:t>11.08.2021</a:t>
             </a:fld>
             <a:endParaRPr lang="de-DE"/>
           </a:p>
@@ -2079,13 +1834,7 @@
       </p:sp>
       <p:sp>
         <p:nvSpPr>
-          <p:cNvPr id="3" name="Fußzeilenplatzhalter 2">
-            <a:extLst>
-              <a:ext uri="{FF2B5EF4-FFF2-40B4-BE49-F238E27FC236}">
-                <a16:creationId xmlns:a16="http://schemas.microsoft.com/office/drawing/2014/main" id="{992C666F-524E-4EC2-B6DB-B234DC585FAE}"/>
-              </a:ext>
-            </a:extLst>
-          </p:cNvPr>
+          <p:cNvPr id="3" name="Footer Placeholder 2"/>
           <p:cNvSpPr>
             <a:spLocks noGrp="1"/>
           </p:cNvSpPr>
@@ -2104,13 +1853,7 @@
       </p:sp>
       <p:sp>
         <p:nvSpPr>
-          <p:cNvPr id="4" name="Foliennummernplatzhalter 3">
-            <a:extLst>
-              <a:ext uri="{FF2B5EF4-FFF2-40B4-BE49-F238E27FC236}">
-                <a16:creationId xmlns:a16="http://schemas.microsoft.com/office/drawing/2014/main" id="{4EDFABEF-FB34-48CF-A5D4-AECF9D8D53F7}"/>
-              </a:ext>
-            </a:extLst>
-          </p:cNvPr>
+          <p:cNvPr id="4" name="Slide Number Placeholder 3"/>
           <p:cNvSpPr>
             <a:spLocks noGrp="1"/>
           </p:cNvSpPr>
@@ -2134,7 +1877,7 @@
     </p:spTree>
     <p:extLst>
       <p:ext uri="{BB962C8B-B14F-4D97-AF65-F5344CB8AC3E}">
-        <p14:creationId xmlns:p14="http://schemas.microsoft.com/office/powerpoint/2010/main" val="1402398081"/>
+        <p14:creationId xmlns:p14="http://schemas.microsoft.com/office/powerpoint/2010/main" val="1331358068"/>
       </p:ext>
     </p:extLst>
   </p:cSld>
@@ -2163,13 +1906,7 @@
       </p:grpSpPr>
       <p:sp>
         <p:nvSpPr>
-          <p:cNvPr id="2" name="Titel 1">
-            <a:extLst>
-              <a:ext uri="{FF2B5EF4-FFF2-40B4-BE49-F238E27FC236}">
-                <a16:creationId xmlns:a16="http://schemas.microsoft.com/office/drawing/2014/main" id="{82529E16-09B2-4F5B-8FD8-870265000562}"/>
-              </a:ext>
-            </a:extLst>
-          </p:cNvPr>
+          <p:cNvPr id="2" name="Title 1"/>
           <p:cNvSpPr>
             <a:spLocks noGrp="1"/>
           </p:cNvSpPr>
@@ -2195,18 +1932,13 @@
               <a:rPr lang="de-DE"/>
               <a:t>Mastertitelformat bearbeiten</a:t>
             </a:r>
-          </a:p>
-        </p:txBody>
-      </p:sp>
-      <p:sp>
-        <p:nvSpPr>
-          <p:cNvPr id="3" name="Inhaltsplatzhalter 2">
-            <a:extLst>
-              <a:ext uri="{FF2B5EF4-FFF2-40B4-BE49-F238E27FC236}">
-                <a16:creationId xmlns:a16="http://schemas.microsoft.com/office/drawing/2014/main" id="{9F203C80-57C1-400E-A70F-7E8D36B00CD0}"/>
-              </a:ext>
-            </a:extLst>
-          </p:cNvPr>
+            <a:endParaRPr lang="en-US" dirty="0"/>
+          </a:p>
+        </p:txBody>
+      </p:sp>
+      <p:sp>
+        <p:nvSpPr>
+          <p:cNvPr id="3" name="Content Placeholder 2"/>
           <p:cNvSpPr>
             <a:spLocks noGrp="1"/>
           </p:cNvSpPr>
@@ -2285,18 +2017,13 @@
               <a:rPr lang="de-DE"/>
               <a:t>Fünfte Ebene</a:t>
             </a:r>
-          </a:p>
-        </p:txBody>
-      </p:sp>
-      <p:sp>
-        <p:nvSpPr>
-          <p:cNvPr id="4" name="Textplatzhalter 3">
-            <a:extLst>
-              <a:ext uri="{FF2B5EF4-FFF2-40B4-BE49-F238E27FC236}">
-                <a16:creationId xmlns:a16="http://schemas.microsoft.com/office/drawing/2014/main" id="{6593C68C-4DA0-4F84-8233-908748D62F48}"/>
-              </a:ext>
-            </a:extLst>
-          </p:cNvPr>
+            <a:endParaRPr lang="en-US" dirty="0"/>
+          </a:p>
+        </p:txBody>
+      </p:sp>
+      <p:sp>
+        <p:nvSpPr>
+          <p:cNvPr id="4" name="Text Placeholder 3"/>
           <p:cNvSpPr>
             <a:spLocks noGrp="1"/>
           </p:cNvSpPr>
@@ -2361,13 +2088,7 @@
       </p:sp>
       <p:sp>
         <p:nvSpPr>
-          <p:cNvPr id="5" name="Datumsplatzhalter 4">
-            <a:extLst>
-              <a:ext uri="{FF2B5EF4-FFF2-40B4-BE49-F238E27FC236}">
-                <a16:creationId xmlns:a16="http://schemas.microsoft.com/office/drawing/2014/main" id="{FDE21E56-7030-4196-90F8-E1A5A6176FB8}"/>
-              </a:ext>
-            </a:extLst>
-          </p:cNvPr>
+          <p:cNvPr id="5" name="Date Placeholder 4"/>
           <p:cNvSpPr>
             <a:spLocks noGrp="1"/>
           </p:cNvSpPr>
@@ -2382,7 +2103,7 @@
           <a:p>
             <a:fld id="{736D181F-5524-47DD-B4BD-9A9A21FDF560}" type="datetimeFigureOut">
               <a:rPr lang="de-DE" smtClean="0"/>
-              <a:t>09.08.2021</a:t>
+              <a:t>11.08.2021</a:t>
             </a:fld>
             <a:endParaRPr lang="de-DE"/>
           </a:p>
@@ -2390,13 +2111,7 @@
       </p:sp>
       <p:sp>
         <p:nvSpPr>
-          <p:cNvPr id="6" name="Fußzeilenplatzhalter 5">
-            <a:extLst>
-              <a:ext uri="{FF2B5EF4-FFF2-40B4-BE49-F238E27FC236}">
-                <a16:creationId xmlns:a16="http://schemas.microsoft.com/office/drawing/2014/main" id="{975D14F1-9FBE-4D7F-94BD-82CF430BEE4B}"/>
-              </a:ext>
-            </a:extLst>
-          </p:cNvPr>
+          <p:cNvPr id="6" name="Footer Placeholder 5"/>
           <p:cNvSpPr>
             <a:spLocks noGrp="1"/>
           </p:cNvSpPr>
@@ -2415,13 +2130,7 @@
       </p:sp>
       <p:sp>
         <p:nvSpPr>
-          <p:cNvPr id="7" name="Foliennummernplatzhalter 6">
-            <a:extLst>
-              <a:ext uri="{FF2B5EF4-FFF2-40B4-BE49-F238E27FC236}">
-                <a16:creationId xmlns:a16="http://schemas.microsoft.com/office/drawing/2014/main" id="{011CC586-CA49-4B09-9928-55F9A6C15215}"/>
-              </a:ext>
-            </a:extLst>
-          </p:cNvPr>
+          <p:cNvPr id="7" name="Slide Number Placeholder 6"/>
           <p:cNvSpPr>
             <a:spLocks noGrp="1"/>
           </p:cNvSpPr>
@@ -2445,7 +2154,7 @@
     </p:spTree>
     <p:extLst>
       <p:ext uri="{BB962C8B-B14F-4D97-AF65-F5344CB8AC3E}">
-        <p14:creationId xmlns:p14="http://schemas.microsoft.com/office/powerpoint/2010/main" val="1391723248"/>
+        <p14:creationId xmlns:p14="http://schemas.microsoft.com/office/powerpoint/2010/main" val="2334448598"/>
       </p:ext>
     </p:extLst>
   </p:cSld>
@@ -2474,13 +2183,7 @@
       </p:grpSpPr>
       <p:sp>
         <p:nvSpPr>
-          <p:cNvPr id="2" name="Titel 1">
-            <a:extLst>
-              <a:ext uri="{FF2B5EF4-FFF2-40B4-BE49-F238E27FC236}">
-                <a16:creationId xmlns:a16="http://schemas.microsoft.com/office/drawing/2014/main" id="{AF8F0021-CE4C-4EE8-8C68-419418644D7E}"/>
-              </a:ext>
-            </a:extLst>
-          </p:cNvPr>
+          <p:cNvPr id="2" name="Title 1"/>
           <p:cNvSpPr>
             <a:spLocks noGrp="1"/>
           </p:cNvSpPr>
@@ -2506,20 +2209,15 @@
               <a:rPr lang="de-DE"/>
               <a:t>Mastertitelformat bearbeiten</a:t>
             </a:r>
-          </a:p>
-        </p:txBody>
-      </p:sp>
-      <p:sp>
-        <p:nvSpPr>
-          <p:cNvPr id="3" name="Bildplatzhalter 2">
-            <a:extLst>
-              <a:ext uri="{FF2B5EF4-FFF2-40B4-BE49-F238E27FC236}">
-                <a16:creationId xmlns:a16="http://schemas.microsoft.com/office/drawing/2014/main" id="{8A9D750F-5A16-4AE1-83F2-FD6984D2AB84}"/>
-              </a:ext>
-            </a:extLst>
-          </p:cNvPr>
-          <p:cNvSpPr>
-            <a:spLocks noGrp="1"/>
+            <a:endParaRPr lang="en-US" dirty="0"/>
+          </a:p>
+        </p:txBody>
+      </p:sp>
+      <p:sp>
+        <p:nvSpPr>
+          <p:cNvPr id="3" name="Picture Placeholder 2"/>
+          <p:cNvSpPr>
+            <a:spLocks noGrp="1" noChangeAspect="1"/>
           </p:cNvSpPr>
           <p:nvPr>
             <p:ph type="pic" idx="1"/>
@@ -2532,7 +2230,7 @@
           </a:xfrm>
         </p:spPr>
         <p:txBody>
-          <a:bodyPr/>
+          <a:bodyPr anchor="t"/>
           <a:lstStyle>
             <a:lvl1pPr marL="0" indent="0">
               <a:buNone/>
@@ -2572,19 +2270,17 @@
             </a:lvl9pPr>
           </a:lstStyle>
           <a:p>
-            <a:endParaRPr lang="de-DE"/>
-          </a:p>
-        </p:txBody>
-      </p:sp>
-      <p:sp>
-        <p:nvSpPr>
-          <p:cNvPr id="4" name="Textplatzhalter 3">
-            <a:extLst>
-              <a:ext uri="{FF2B5EF4-FFF2-40B4-BE49-F238E27FC236}">
-                <a16:creationId xmlns:a16="http://schemas.microsoft.com/office/drawing/2014/main" id="{3F7EBA03-0B7C-45D7-B0BC-81A940212CE6}"/>
-              </a:ext>
-            </a:extLst>
-          </p:cNvPr>
+            <a:r>
+              <a:rPr lang="de-DE"/>
+              <a:t>Bild durch Klicken auf Symbol hinzufügen</a:t>
+            </a:r>
+            <a:endParaRPr lang="en-US" dirty="0"/>
+          </a:p>
+        </p:txBody>
+      </p:sp>
+      <p:sp>
+        <p:nvSpPr>
+          <p:cNvPr id="4" name="Text Placeholder 3"/>
           <p:cNvSpPr>
             <a:spLocks noGrp="1"/>
           </p:cNvSpPr>
@@ -2649,13 +2345,7 @@
       </p:sp>
       <p:sp>
         <p:nvSpPr>
-          <p:cNvPr id="5" name="Datumsplatzhalter 4">
-            <a:extLst>
-              <a:ext uri="{FF2B5EF4-FFF2-40B4-BE49-F238E27FC236}">
-                <a16:creationId xmlns:a16="http://schemas.microsoft.com/office/drawing/2014/main" id="{C2897981-D4B2-4047-9D95-5E135E7592A8}"/>
-              </a:ext>
-            </a:extLst>
-          </p:cNvPr>
+          <p:cNvPr id="5" name="Date Placeholder 4"/>
           <p:cNvSpPr>
             <a:spLocks noGrp="1"/>
           </p:cNvSpPr>
@@ -2670,7 +2360,7 @@
           <a:p>
             <a:fld id="{736D181F-5524-47DD-B4BD-9A9A21FDF560}" type="datetimeFigureOut">
               <a:rPr lang="de-DE" smtClean="0"/>
-              <a:t>09.08.2021</a:t>
+              <a:t>11.08.2021</a:t>
             </a:fld>
             <a:endParaRPr lang="de-DE"/>
           </a:p>
@@ -2678,13 +2368,7 @@
       </p:sp>
       <p:sp>
         <p:nvSpPr>
-          <p:cNvPr id="6" name="Fußzeilenplatzhalter 5">
-            <a:extLst>
-              <a:ext uri="{FF2B5EF4-FFF2-40B4-BE49-F238E27FC236}">
-                <a16:creationId xmlns:a16="http://schemas.microsoft.com/office/drawing/2014/main" id="{7F516EBD-E9EB-4526-AC50-2ACFA041220B}"/>
-              </a:ext>
-            </a:extLst>
-          </p:cNvPr>
+          <p:cNvPr id="6" name="Footer Placeholder 5"/>
           <p:cNvSpPr>
             <a:spLocks noGrp="1"/>
           </p:cNvSpPr>
@@ -2703,13 +2387,7 @@
       </p:sp>
       <p:sp>
         <p:nvSpPr>
-          <p:cNvPr id="7" name="Foliennummernplatzhalter 6">
-            <a:extLst>
-              <a:ext uri="{FF2B5EF4-FFF2-40B4-BE49-F238E27FC236}">
-                <a16:creationId xmlns:a16="http://schemas.microsoft.com/office/drawing/2014/main" id="{C9D2DCFF-BEED-4457-9FDD-B3CECB8F7143}"/>
-              </a:ext>
-            </a:extLst>
-          </p:cNvPr>
+          <p:cNvPr id="7" name="Slide Number Placeholder 6"/>
           <p:cNvSpPr>
             <a:spLocks noGrp="1"/>
           </p:cNvSpPr>
@@ -2733,7 +2411,7 @@
     </p:spTree>
     <p:extLst>
       <p:ext uri="{BB962C8B-B14F-4D97-AF65-F5344CB8AC3E}">
-        <p14:creationId xmlns:p14="http://schemas.microsoft.com/office/powerpoint/2010/main" val="176089724"/>
+        <p14:creationId xmlns:p14="http://schemas.microsoft.com/office/powerpoint/2010/main" val="1556270065"/>
       </p:ext>
     </p:extLst>
   </p:cSld>
@@ -2767,13 +2445,7 @@
       </p:grpSpPr>
       <p:sp>
         <p:nvSpPr>
-          <p:cNvPr id="2" name="Titelplatzhalter 1">
-            <a:extLst>
-              <a:ext uri="{FF2B5EF4-FFF2-40B4-BE49-F238E27FC236}">
-                <a16:creationId xmlns:a16="http://schemas.microsoft.com/office/drawing/2014/main" id="{30BBE0BE-65BE-4094-9E3E-240E396C2EC8}"/>
-              </a:ext>
-            </a:extLst>
-          </p:cNvPr>
+          <p:cNvPr id="2" name="Title Placeholder 1"/>
           <p:cNvSpPr>
             <a:spLocks noGrp="1"/>
           </p:cNvSpPr>
@@ -2800,18 +2472,13 @@
               <a:rPr lang="de-DE"/>
               <a:t>Mastertitelformat bearbeiten</a:t>
             </a:r>
-          </a:p>
-        </p:txBody>
-      </p:sp>
-      <p:sp>
-        <p:nvSpPr>
-          <p:cNvPr id="3" name="Textplatzhalter 2">
-            <a:extLst>
-              <a:ext uri="{FF2B5EF4-FFF2-40B4-BE49-F238E27FC236}">
-                <a16:creationId xmlns:a16="http://schemas.microsoft.com/office/drawing/2014/main" id="{055C0A7B-451F-4DF8-91F9-410E54DCAE30}"/>
-              </a:ext>
-            </a:extLst>
-          </p:cNvPr>
+            <a:endParaRPr lang="en-US" dirty="0"/>
+          </a:p>
+        </p:txBody>
+      </p:sp>
+      <p:sp>
+        <p:nvSpPr>
+          <p:cNvPr id="3" name="Text Placeholder 2"/>
           <p:cNvSpPr>
             <a:spLocks noGrp="1"/>
           </p:cNvSpPr>
@@ -2867,18 +2534,13 @@
               <a:rPr lang="de-DE"/>
               <a:t>Fünfte Ebene</a:t>
             </a:r>
-          </a:p>
-        </p:txBody>
-      </p:sp>
-      <p:sp>
-        <p:nvSpPr>
-          <p:cNvPr id="4" name="Datumsplatzhalter 3">
-            <a:extLst>
-              <a:ext uri="{FF2B5EF4-FFF2-40B4-BE49-F238E27FC236}">
-                <a16:creationId xmlns:a16="http://schemas.microsoft.com/office/drawing/2014/main" id="{35E2D9C5-02CB-4274-BE17-3CBDE1FDEC5C}"/>
-              </a:ext>
-            </a:extLst>
-          </p:cNvPr>
+            <a:endParaRPr lang="en-US" dirty="0"/>
+          </a:p>
+        </p:txBody>
+      </p:sp>
+      <p:sp>
+        <p:nvSpPr>
+          <p:cNvPr id="4" name="Date Placeholder 3"/>
           <p:cNvSpPr>
             <a:spLocks noGrp="1"/>
           </p:cNvSpPr>
@@ -2911,7 +2573,7 @@
           <a:p>
             <a:fld id="{736D181F-5524-47DD-B4BD-9A9A21FDF560}" type="datetimeFigureOut">
               <a:rPr lang="de-DE" smtClean="0"/>
-              <a:t>09.08.2021</a:t>
+              <a:t>11.08.2021</a:t>
             </a:fld>
             <a:endParaRPr lang="de-DE"/>
           </a:p>
@@ -2919,13 +2581,7 @@
       </p:sp>
       <p:sp>
         <p:nvSpPr>
-          <p:cNvPr id="5" name="Fußzeilenplatzhalter 4">
-            <a:extLst>
-              <a:ext uri="{FF2B5EF4-FFF2-40B4-BE49-F238E27FC236}">
-                <a16:creationId xmlns:a16="http://schemas.microsoft.com/office/drawing/2014/main" id="{1E31A639-AAEB-42E5-AE06-3D2955C7662E}"/>
-              </a:ext>
-            </a:extLst>
-          </p:cNvPr>
+          <p:cNvPr id="5" name="Footer Placeholder 4"/>
           <p:cNvSpPr>
             <a:spLocks noGrp="1"/>
           </p:cNvSpPr>
@@ -2962,13 +2618,7 @@
       </p:sp>
       <p:sp>
         <p:nvSpPr>
-          <p:cNvPr id="6" name="Foliennummernplatzhalter 5">
-            <a:extLst>
-              <a:ext uri="{FF2B5EF4-FFF2-40B4-BE49-F238E27FC236}">
-                <a16:creationId xmlns:a16="http://schemas.microsoft.com/office/drawing/2014/main" id="{DB514D52-2F60-47C7-B31B-157E65E85568}"/>
-              </a:ext>
-            </a:extLst>
-          </p:cNvPr>
+          <p:cNvPr id="6" name="Slide Number Placeholder 5"/>
           <p:cNvSpPr>
             <a:spLocks noGrp="1"/>
           </p:cNvSpPr>
@@ -3010,23 +2660,23 @@
     </p:spTree>
     <p:extLst>
       <p:ext uri="{BB962C8B-B14F-4D97-AF65-F5344CB8AC3E}">
-        <p14:creationId xmlns:p14="http://schemas.microsoft.com/office/powerpoint/2010/main" val="724540770"/>
+        <p14:creationId xmlns:p14="http://schemas.microsoft.com/office/powerpoint/2010/main" val="1942721270"/>
       </p:ext>
     </p:extLst>
   </p:cSld>
   <p:clrMap bg1="lt1" tx1="dk1" bg2="lt2" tx2="dk2" accent1="accent1" accent2="accent2" accent3="accent3" accent4="accent4" accent5="accent5" accent6="accent6" hlink="hlink" folHlink="folHlink"/>
   <p:sldLayoutIdLst>
-    <p:sldLayoutId id="2147483649" r:id="rId1"/>
-    <p:sldLayoutId id="2147483650" r:id="rId2"/>
-    <p:sldLayoutId id="2147483651" r:id="rId3"/>
-    <p:sldLayoutId id="2147483652" r:id="rId4"/>
-    <p:sldLayoutId id="2147483653" r:id="rId5"/>
-    <p:sldLayoutId id="2147483654" r:id="rId6"/>
-    <p:sldLayoutId id="2147483655" r:id="rId7"/>
-    <p:sldLayoutId id="2147483656" r:id="rId8"/>
-    <p:sldLayoutId id="2147483657" r:id="rId9"/>
-    <p:sldLayoutId id="2147483658" r:id="rId10"/>
-    <p:sldLayoutId id="2147483659" r:id="rId11"/>
+    <p:sldLayoutId id="2147483709" r:id="rId1"/>
+    <p:sldLayoutId id="2147483710" r:id="rId2"/>
+    <p:sldLayoutId id="2147483711" r:id="rId3"/>
+    <p:sldLayoutId id="2147483712" r:id="rId4"/>
+    <p:sldLayoutId id="2147483713" r:id="rId5"/>
+    <p:sldLayoutId id="2147483714" r:id="rId6"/>
+    <p:sldLayoutId id="2147483715" r:id="rId7"/>
+    <p:sldLayoutId id="2147483716" r:id="rId8"/>
+    <p:sldLayoutId id="2147483717" r:id="rId9"/>
+    <p:sldLayoutId id="2147483718" r:id="rId10"/>
+    <p:sldLayoutId id="2147483719" r:id="rId11"/>
   </p:sldLayoutIdLst>
   <p:txStyles>
     <p:titleStyle>
@@ -3214,7 +2864,7 @@
     </p:bodyStyle>
     <p:otherStyle>
       <a:defPPr>
-        <a:defRPr lang="de-DE"/>
+        <a:defRPr lang="en-US"/>
       </a:defPPr>
       <a:lvl1pPr marL="0" algn="l" defTabSz="914400" rtl="0" eaLnBrk="1" latinLnBrk="0" hangingPunct="1">
         <a:defRPr sz="1800" kern="1200">
@@ -3418,7 +3068,7 @@
           <p:cNvPr id="2" name="Titel 1">
             <a:extLst>
               <a:ext uri="{FF2B5EF4-FFF2-40B4-BE49-F238E27FC236}">
-                <a16:creationId xmlns:a16="http://schemas.microsoft.com/office/drawing/2014/main" id="{2D921826-4DEE-4A76-8175-38CC4E61D438}"/>
+                <a16:creationId xmlns:a16="http://schemas.microsoft.com/office/drawing/2014/main" id="{55C9C175-276E-4FDE-B4D0-8639E8A65B6F}"/>
               </a:ext>
             </a:extLst>
           </p:cNvPr>
@@ -3429,7 +3079,12 @@
             <p:ph type="title"/>
           </p:nvPr>
         </p:nvSpPr>
-        <p:spPr/>
+        <p:spPr>
+          <a:xfrm>
+            <a:off x="838200" y="313609"/>
+            <a:ext cx="10515600" cy="1325563"/>
+          </a:xfrm>
+        </p:spPr>
         <p:txBody>
           <a:bodyPr/>
           <a:lstStyle/>
@@ -3438,7 +3093,6 @@
               <a:rPr lang="en-GB" dirty="0"/>
               <a:t>Outline</a:t>
             </a:r>
-            <a:endParaRPr lang="en-GB" noProof="0" dirty="0"/>
           </a:p>
         </p:txBody>
       </p:sp>
@@ -3447,7 +3101,7 @@
           <p:cNvPr id="3" name="Inhaltsplatzhalter 2">
             <a:extLst>
               <a:ext uri="{FF2B5EF4-FFF2-40B4-BE49-F238E27FC236}">
-                <a16:creationId xmlns:a16="http://schemas.microsoft.com/office/drawing/2014/main" id="{BA21E14E-D6F4-42B7-ABE1-3A598CAD6698}"/>
+                <a16:creationId xmlns:a16="http://schemas.microsoft.com/office/drawing/2014/main" id="{36CEAB38-19D0-4DCE-8302-0238B221A221}"/>
               </a:ext>
             </a:extLst>
           </p:cNvPr>
@@ -3460,203 +3114,151 @@
         </p:nvSpPr>
         <p:spPr/>
         <p:txBody>
-          <a:bodyPr>
-            <a:normAutofit fontScale="47500" lnSpcReduction="20000"/>
-          </a:bodyPr>
-          <a:lstStyle/>
-          <a:p>
-            <a:pPr marL="0" indent="0">
-              <a:buNone/>
-            </a:pPr>
-            <a:r>
-              <a:rPr lang="en-GB" noProof="0" dirty="0"/>
-              <a:t>1. Goals</a:t>
-            </a:r>
-          </a:p>
-          <a:p>
-            <a:pPr marL="0" indent="0">
-              <a:buNone/>
-            </a:pPr>
-            <a:r>
-              <a:rPr lang="en-GB" dirty="0"/>
-              <a:t>2. </a:t>
-            </a:r>
-            <a:r>
-              <a:rPr lang="en-GB" dirty="0" err="1"/>
-              <a:t>Vorgehen</a:t>
-            </a:r>
-            <a:endParaRPr lang="en-GB" dirty="0"/>
-          </a:p>
-          <a:p>
-            <a:pPr marL="0" indent="0">
-              <a:buNone/>
-            </a:pPr>
-            <a:r>
-              <a:rPr lang="en-GB" dirty="0"/>
-              <a:t>2.1. Collecting the data from twitter </a:t>
-            </a:r>
-          </a:p>
-          <a:p>
-            <a:pPr marL="0" indent="0">
-              <a:buNone/>
-            </a:pPr>
-            <a:r>
-              <a:rPr lang="en-GB" dirty="0"/>
-              <a:t>2.2. Building a classifier</a:t>
-            </a:r>
-          </a:p>
-          <a:p>
-            <a:pPr marL="0" indent="0">
-              <a:buNone/>
-            </a:pPr>
-            <a:r>
-              <a:rPr lang="en-GB" dirty="0"/>
-              <a:t>2.2.1. Dataset generation</a:t>
-            </a:r>
-          </a:p>
-          <a:p>
-            <a:pPr marL="0" indent="0">
-              <a:buNone/>
-            </a:pPr>
-            <a:r>
-              <a:rPr lang="en-GB" dirty="0"/>
-              <a:t>2.2.2. Model</a:t>
-            </a:r>
-          </a:p>
-          <a:p>
-            <a:pPr marL="0" indent="0">
-              <a:buNone/>
-            </a:pPr>
-            <a:r>
-              <a:rPr lang="en-GB" dirty="0"/>
-              <a:t>2.2.3. Hyperparameter optimization </a:t>
-            </a:r>
-          </a:p>
-          <a:p>
-            <a:pPr marL="0" indent="0">
-              <a:buNone/>
-            </a:pPr>
-            <a:r>
-              <a:rPr lang="en-GB" dirty="0"/>
-              <a:t>2.2.3. Evaluation of the Model</a:t>
-            </a:r>
-          </a:p>
-          <a:p>
-            <a:pPr marL="0" indent="0">
-              <a:buNone/>
-            </a:pPr>
-            <a:r>
-              <a:rPr lang="en-GB" dirty="0"/>
-              <a:t>2.2.3. Prediction of the LKR party</a:t>
-            </a:r>
-          </a:p>
-          <a:p>
-            <a:pPr marL="0" indent="0">
-              <a:buNone/>
-            </a:pPr>
-            <a:r>
-              <a:rPr lang="en-GB" dirty="0"/>
-              <a:t>2.3. Building a classifier for the b</a:t>
-            </a:r>
-            <a:r>
-              <a:rPr lang="de-DE" dirty="0" err="1"/>
-              <a:t>ig</a:t>
-            </a:r>
-            <a:r>
-              <a:rPr lang="de-DE" dirty="0"/>
-              <a:t> Five </a:t>
-            </a:r>
-            <a:r>
-              <a:rPr lang="de-DE" dirty="0" err="1"/>
-              <a:t>personality</a:t>
-            </a:r>
-            <a:r>
-              <a:rPr lang="de-DE" dirty="0"/>
-              <a:t> </a:t>
-            </a:r>
-            <a:r>
-              <a:rPr lang="de-DE" dirty="0" err="1"/>
-              <a:t>traits</a:t>
-            </a:r>
-            <a:endParaRPr lang="de-DE" dirty="0"/>
-          </a:p>
-          <a:p>
-            <a:pPr marL="0" indent="0">
-              <a:buNone/>
-            </a:pPr>
-            <a:r>
-              <a:rPr lang="en-GB" dirty="0"/>
-              <a:t>2.3.1. </a:t>
-            </a:r>
-            <a:r>
-              <a:rPr lang="en-GB" dirty="0" err="1"/>
-              <a:t>Vorgehen</a:t>
-            </a:r>
-            <a:endParaRPr lang="en-GB" dirty="0"/>
-          </a:p>
-          <a:p>
-            <a:pPr marL="0" indent="0">
-              <a:buNone/>
-            </a:pPr>
-            <a:r>
-              <a:rPr lang="en-GB" dirty="0"/>
-              <a:t>2.3.2. Translation of the tweets with Transformer model</a:t>
-            </a:r>
-          </a:p>
-          <a:p>
-            <a:pPr marL="0" indent="0">
-              <a:buNone/>
-            </a:pPr>
-            <a:r>
-              <a:rPr lang="en-GB" dirty="0"/>
-              <a:t>2.3.3. Translation with Google Translate</a:t>
-            </a:r>
-          </a:p>
-          <a:p>
-            <a:pPr marL="0" indent="0">
-              <a:buNone/>
-            </a:pPr>
-            <a:r>
-              <a:rPr lang="en-GB" dirty="0"/>
-              <a:t>2.3.4. Building the dataset</a:t>
-            </a:r>
-          </a:p>
-          <a:p>
-            <a:pPr marL="0" indent="0">
-              <a:buNone/>
-            </a:pPr>
-            <a:r>
-              <a:rPr lang="en-GB" dirty="0"/>
-              <a:t>2.3.4. Evaluation of the different </a:t>
-            </a:r>
-            <a:r>
-              <a:rPr lang="en-GB" dirty="0" err="1"/>
-              <a:t>aproches</a:t>
-            </a:r>
-            <a:endParaRPr lang="en-GB" dirty="0"/>
-          </a:p>
-          <a:p>
-            <a:pPr marL="0" indent="0">
-              <a:buNone/>
-            </a:pPr>
-            <a:r>
-              <a:rPr lang="en-GB" dirty="0"/>
-              <a:t>3. Summary	</a:t>
-            </a:r>
-          </a:p>
+          <a:bodyPr/>
+          <a:lstStyle/>
           <a:p>
             <a:pPr marL="514350" indent="-514350">
               <a:buFont typeface="+mj-lt"/>
               <a:buAutoNum type="arabicPeriod"/>
             </a:pPr>
-            <a:endParaRPr lang="en-GB" noProof="0" dirty="0"/>
+            <a:r>
+              <a:rPr lang="en-GB" dirty="0"/>
+              <a:t>Goals</a:t>
+            </a:r>
+          </a:p>
+          <a:p>
+            <a:pPr marL="514350" indent="-514350">
+              <a:buFont typeface="+mj-lt"/>
+              <a:buAutoNum type="arabicPeriod"/>
+            </a:pPr>
+            <a:r>
+              <a:rPr lang="en-GB" dirty="0"/>
+              <a:t>Collecting the data from twitter</a:t>
+            </a:r>
+          </a:p>
+          <a:p>
+            <a:pPr marL="514350" indent="-514350">
+              <a:buFont typeface="+mj-lt"/>
+              <a:buAutoNum type="arabicPeriod"/>
+            </a:pPr>
+            <a:r>
+              <a:rPr lang="en-GB" dirty="0"/>
+              <a:t>Building the party classifier</a:t>
+            </a:r>
+          </a:p>
+          <a:p>
+            <a:pPr marL="971550" lvl="1" indent="-514350">
+              <a:buFont typeface="+mj-lt"/>
+              <a:buAutoNum type="arabicPeriod"/>
+            </a:pPr>
+            <a:r>
+              <a:rPr lang="en-GB" dirty="0"/>
+              <a:t>Main idea</a:t>
+            </a:r>
+          </a:p>
+          <a:p>
+            <a:pPr marL="971550" lvl="1" indent="-514350">
+              <a:buFont typeface="+mj-lt"/>
+              <a:buAutoNum type="arabicPeriod"/>
+            </a:pPr>
+            <a:r>
+              <a:rPr lang="en-GB" dirty="0"/>
+              <a:t>Creating the dataset</a:t>
+            </a:r>
+          </a:p>
+          <a:p>
+            <a:pPr marL="971550" lvl="1" indent="-514350">
+              <a:buFont typeface="+mj-lt"/>
+              <a:buAutoNum type="arabicPeriod"/>
+            </a:pPr>
+            <a:r>
+              <a:rPr lang="en-GB" dirty="0"/>
+              <a:t>Structure of the model</a:t>
+            </a:r>
+          </a:p>
+          <a:p>
+            <a:pPr marL="971550" lvl="1" indent="-514350">
+              <a:buFont typeface="+mj-lt"/>
+              <a:buAutoNum type="arabicPeriod"/>
+            </a:pPr>
+            <a:r>
+              <a:rPr lang="en-GB" dirty="0"/>
+              <a:t>Hyperparameter optimization with </a:t>
+            </a:r>
+            <a:r>
+              <a:rPr lang="en-GB" dirty="0" err="1"/>
+              <a:t>Kerastuner</a:t>
+            </a:r>
+            <a:endParaRPr lang="en-GB" dirty="0"/>
+          </a:p>
+          <a:p>
+            <a:pPr marL="971550" lvl="1" indent="-514350">
+              <a:buFont typeface="+mj-lt"/>
+              <a:buAutoNum type="arabicPeriod"/>
+            </a:pPr>
+            <a:r>
+              <a:rPr lang="en-GB" dirty="0"/>
+              <a:t>Evaluation of the trained model</a:t>
+            </a:r>
+          </a:p>
+          <a:p>
+            <a:pPr marL="971550" lvl="1" indent="-514350">
+              <a:buFont typeface="+mj-lt"/>
+              <a:buAutoNum type="arabicPeriod"/>
+            </a:pPr>
+            <a:r>
+              <a:rPr lang="en-GB" dirty="0"/>
+              <a:t>Testing with the LKR-party</a:t>
+            </a:r>
+          </a:p>
+          <a:p>
+            <a:pPr marL="971550" lvl="1" indent="-514350">
+              <a:buFont typeface="+mj-lt"/>
+              <a:buAutoNum type="arabicPeriod"/>
+            </a:pPr>
+            <a:endParaRPr lang="en-GB" dirty="0"/>
+          </a:p>
+          <a:p>
+            <a:pPr marL="971550" lvl="1" indent="-514350">
+              <a:buFont typeface="+mj-lt"/>
+              <a:buAutoNum type="arabicPeriod"/>
+            </a:pPr>
+            <a:endParaRPr lang="en-GB" dirty="0"/>
+          </a:p>
+          <a:p>
+            <a:pPr marL="971550" lvl="1" indent="-514350">
+              <a:buFont typeface="+mj-lt"/>
+              <a:buAutoNum type="arabicPeriod"/>
+            </a:pPr>
+            <a:endParaRPr lang="en-GB" dirty="0"/>
+          </a:p>
+          <a:p>
+            <a:pPr marL="514350" indent="-514350">
+              <a:buFont typeface="+mj-lt"/>
+              <a:buAutoNum type="arabicPeriod"/>
+            </a:pPr>
+            <a:endParaRPr lang="en-GB" dirty="0"/>
+          </a:p>
+          <a:p>
+            <a:pPr marL="514350" indent="-514350">
+              <a:buFont typeface="+mj-lt"/>
+              <a:buAutoNum type="arabicPeriod"/>
+            </a:pPr>
+            <a:endParaRPr lang="en-GB" dirty="0"/>
+          </a:p>
+          <a:p>
+            <a:pPr marL="514350" indent="-514350">
+              <a:buFont typeface="+mj-lt"/>
+              <a:buAutoNum type="arabicPeriod"/>
+            </a:pPr>
+            <a:endParaRPr lang="en-GB" dirty="0"/>
           </a:p>
         </p:txBody>
       </p:sp>
     </p:spTree>
     <p:extLst>
       <p:ext uri="{BB962C8B-B14F-4D97-AF65-F5344CB8AC3E}">
-        <p14:creationId xmlns:p14="http://schemas.microsoft.com/office/powerpoint/2010/main" val="248408522"/>
+        <p14:creationId xmlns:p14="http://schemas.microsoft.com/office/powerpoint/2010/main" val="1036115521"/>
       </p:ext>
     </p:extLst>
   </p:cSld>
@@ -3688,6 +3290,241 @@
           <p:cNvPr id="2" name="Titel 1">
             <a:extLst>
               <a:ext uri="{FF2B5EF4-FFF2-40B4-BE49-F238E27FC236}">
+                <a16:creationId xmlns:a16="http://schemas.microsoft.com/office/drawing/2014/main" id="{55C9C175-276E-4FDE-B4D0-8639E8A65B6F}"/>
+              </a:ext>
+            </a:extLst>
+          </p:cNvPr>
+          <p:cNvSpPr>
+            <a:spLocks noGrp="1"/>
+          </p:cNvSpPr>
+          <p:nvPr>
+            <p:ph type="title"/>
+          </p:nvPr>
+        </p:nvSpPr>
+        <p:spPr/>
+        <p:txBody>
+          <a:bodyPr/>
+          <a:lstStyle/>
+          <a:p>
+            <a:r>
+              <a:rPr lang="en-GB"/>
+              <a:t>Outline</a:t>
+            </a:r>
+            <a:endParaRPr lang="en-GB" dirty="0"/>
+          </a:p>
+        </p:txBody>
+      </p:sp>
+      <p:sp>
+        <p:nvSpPr>
+          <p:cNvPr id="3" name="Inhaltsplatzhalter 2">
+            <a:extLst>
+              <a:ext uri="{FF2B5EF4-FFF2-40B4-BE49-F238E27FC236}">
+                <a16:creationId xmlns:a16="http://schemas.microsoft.com/office/drawing/2014/main" id="{36CEAB38-19D0-4DCE-8302-0238B221A221}"/>
+              </a:ext>
+            </a:extLst>
+          </p:cNvPr>
+          <p:cNvSpPr>
+            <a:spLocks noGrp="1"/>
+          </p:cNvSpPr>
+          <p:nvPr>
+            <p:ph idx="1"/>
+          </p:nvPr>
+        </p:nvSpPr>
+        <p:spPr/>
+        <p:txBody>
+          <a:bodyPr>
+            <a:normAutofit lnSpcReduction="10000"/>
+          </a:bodyPr>
+          <a:lstStyle/>
+          <a:p>
+            <a:pPr marL="514350" indent="-514350">
+              <a:buFont typeface="+mj-lt"/>
+              <a:buAutoNum type="arabicPeriod" startAt="4"/>
+            </a:pPr>
+            <a:r>
+              <a:rPr lang="en-GB" dirty="0"/>
+              <a:t>Building a classifier for the Big5personality traits analysis </a:t>
+            </a:r>
+          </a:p>
+          <a:p>
+            <a:pPr marL="971550" lvl="1" indent="-514350">
+              <a:buFont typeface="+mj-lt"/>
+              <a:buAutoNum type="arabicPeriod"/>
+            </a:pPr>
+            <a:r>
+              <a:rPr lang="en-GB" dirty="0"/>
+              <a:t>Main idea</a:t>
+            </a:r>
+          </a:p>
+          <a:p>
+            <a:pPr marL="971550" lvl="1" indent="-514350">
+              <a:buFont typeface="+mj-lt"/>
+              <a:buAutoNum type="arabicPeriod"/>
+            </a:pPr>
+            <a:r>
+              <a:rPr lang="en-GB" dirty="0"/>
+              <a:t>Creating the dataset</a:t>
+            </a:r>
+          </a:p>
+          <a:p>
+            <a:pPr marL="1428750" lvl="2" indent="-514350">
+              <a:buFont typeface="+mj-lt"/>
+              <a:buAutoNum type="arabicPeriod"/>
+            </a:pPr>
+            <a:r>
+              <a:rPr lang="en-GB" dirty="0"/>
+              <a:t>Building our own Transformer Model for translation</a:t>
+            </a:r>
+          </a:p>
+          <a:p>
+            <a:pPr marL="1428750" lvl="2" indent="-514350">
+              <a:buFont typeface="+mj-lt"/>
+              <a:buAutoNum type="arabicPeriod"/>
+            </a:pPr>
+            <a:r>
+              <a:rPr lang="en-GB" dirty="0"/>
+              <a:t>Using Google translate</a:t>
+            </a:r>
+          </a:p>
+          <a:p>
+            <a:pPr marL="971550" lvl="1" indent="-514350">
+              <a:buFont typeface="+mj-lt"/>
+              <a:buAutoNum type="arabicPeriod"/>
+            </a:pPr>
+            <a:r>
+              <a:rPr lang="en-GB" dirty="0"/>
+              <a:t>Structure of the model</a:t>
+            </a:r>
+          </a:p>
+          <a:p>
+            <a:pPr marL="971550" lvl="1" indent="-514350">
+              <a:buFont typeface="+mj-lt"/>
+              <a:buAutoNum type="arabicPeriod"/>
+            </a:pPr>
+            <a:r>
+              <a:rPr lang="en-GB" dirty="0"/>
+              <a:t>Training different BERT-models</a:t>
+            </a:r>
+          </a:p>
+          <a:p>
+            <a:pPr marL="971550" lvl="1" indent="-514350">
+              <a:buFont typeface="+mj-lt"/>
+              <a:buAutoNum type="arabicPeriod"/>
+            </a:pPr>
+            <a:r>
+              <a:rPr lang="en-GB" dirty="0"/>
+              <a:t>Comparing of two different approaches </a:t>
+            </a:r>
+          </a:p>
+          <a:p>
+            <a:pPr marL="971550" lvl="1" indent="-514350">
+              <a:buFont typeface="+mj-lt"/>
+              <a:buAutoNum type="arabicPeriod"/>
+            </a:pPr>
+            <a:r>
+              <a:rPr lang="en-GB" dirty="0"/>
+              <a:t>Evaluation of the trained model</a:t>
+            </a:r>
+          </a:p>
+          <a:p>
+            <a:pPr marL="971550" lvl="1" indent="-514350">
+              <a:buFont typeface="+mj-lt"/>
+              <a:buAutoNum type="arabicPeriod"/>
+            </a:pPr>
+            <a:r>
+              <a:rPr lang="en-GB" dirty="0"/>
+              <a:t>Application on our Twitter data</a:t>
+            </a:r>
+          </a:p>
+          <a:p>
+            <a:pPr marL="514350" indent="-514350">
+              <a:buFont typeface="+mj-lt"/>
+              <a:buAutoNum type="arabicPeriod" startAt="4"/>
+            </a:pPr>
+            <a:r>
+              <a:rPr lang="en-GB" dirty="0"/>
+              <a:t>Summary</a:t>
+            </a:r>
+          </a:p>
+          <a:p>
+            <a:pPr marL="971550" lvl="1" indent="-514350">
+              <a:buFont typeface="+mj-lt"/>
+              <a:buAutoNum type="arabicPeriod"/>
+            </a:pPr>
+            <a:endParaRPr lang="en-GB" dirty="0"/>
+          </a:p>
+          <a:p>
+            <a:pPr marL="971550" lvl="1" indent="-514350">
+              <a:buFont typeface="+mj-lt"/>
+              <a:buAutoNum type="arabicPeriod"/>
+            </a:pPr>
+            <a:endParaRPr lang="en-GB" dirty="0"/>
+          </a:p>
+          <a:p>
+            <a:pPr marL="971550" lvl="1" indent="-514350">
+              <a:buFont typeface="+mj-lt"/>
+              <a:buAutoNum type="arabicPeriod"/>
+            </a:pPr>
+            <a:endParaRPr lang="en-GB" dirty="0"/>
+          </a:p>
+          <a:p>
+            <a:pPr marL="514350" indent="-514350">
+              <a:buFont typeface="+mj-lt"/>
+              <a:buAutoNum type="arabicPeriod" startAt="4"/>
+            </a:pPr>
+            <a:endParaRPr lang="en-GB" dirty="0"/>
+          </a:p>
+          <a:p>
+            <a:pPr marL="514350" indent="-514350">
+              <a:buFont typeface="+mj-lt"/>
+              <a:buAutoNum type="arabicPeriod" startAt="4"/>
+            </a:pPr>
+            <a:endParaRPr lang="en-GB" dirty="0"/>
+          </a:p>
+          <a:p>
+            <a:pPr marL="514350" indent="-514350">
+              <a:buFont typeface="+mj-lt"/>
+              <a:buAutoNum type="arabicPeriod" startAt="4"/>
+            </a:pPr>
+            <a:endParaRPr lang="en-GB" dirty="0"/>
+          </a:p>
+        </p:txBody>
+      </p:sp>
+    </p:spTree>
+    <p:extLst>
+      <p:ext uri="{BB962C8B-B14F-4D97-AF65-F5344CB8AC3E}">
+        <p14:creationId xmlns:p14="http://schemas.microsoft.com/office/powerpoint/2010/main" val="4281853782"/>
+      </p:ext>
+    </p:extLst>
+  </p:cSld>
+  <p:clrMapOvr>
+    <a:masterClrMapping/>
+  </p:clrMapOvr>
+</p:sld>
+</file>
+
+<file path=ppt/slides/slide4.xml><?xml version="1.0" encoding="utf-8"?>
+<p:sld xmlns:a="http://schemas.openxmlformats.org/drawingml/2006/main" xmlns:r="http://schemas.openxmlformats.org/officeDocument/2006/relationships" xmlns:p="http://schemas.openxmlformats.org/presentationml/2006/main">
+  <p:cSld>
+    <p:spTree>
+      <p:nvGrpSpPr>
+        <p:cNvPr id="1" name=""/>
+        <p:cNvGrpSpPr/>
+        <p:nvPr/>
+      </p:nvGrpSpPr>
+      <p:grpSpPr>
+        <a:xfrm>
+          <a:off x="0" y="0"/>
+          <a:ext cx="0" cy="0"/>
+          <a:chOff x="0" y="0"/>
+          <a:chExt cx="0" cy="0"/>
+        </a:xfrm>
+      </p:grpSpPr>
+      <p:sp>
+        <p:nvSpPr>
+          <p:cNvPr id="2" name="Titel 1">
+            <a:extLst>
+              <a:ext uri="{FF2B5EF4-FFF2-40B4-BE49-F238E27FC236}">
                 <a16:creationId xmlns:a16="http://schemas.microsoft.com/office/drawing/2014/main" id="{874BE24C-9B72-424C-91C0-B46629BD78B7}"/>
               </a:ext>
             </a:extLst>
@@ -3705,9 +3542,10 @@
           <a:lstStyle/>
           <a:p>
             <a:r>
-              <a:rPr lang="en-GB" noProof="0" dirty="0"/>
+              <a:rPr lang="en-GB" noProof="0"/>
               <a:t>Goals</a:t>
             </a:r>
+            <a:endParaRPr lang="en-GB" noProof="0" dirty="0"/>
           </a:p>
         </p:txBody>
       </p:sp>
@@ -3733,42 +3571,32 @@
           <a:lstStyle/>
           <a:p>
             <a:r>
+              <a:rPr lang="en-GB" dirty="0"/>
+              <a:t>Find out if it is possible to classify the political sentiment on twitter by multiple tweets</a:t>
+            </a:r>
+          </a:p>
+          <a:p>
+            <a:r>
               <a:rPr lang="en-GB" noProof="0" dirty="0"/>
-              <a:t>Collecting information of German politics from twitter</a:t>
-            </a:r>
-          </a:p>
-          <a:p>
+              <a:t>Experiment if the Big5 personality traits analysis is also possible </a:t>
+            </a:r>
             <a:r>
               <a:rPr lang="en-GB" dirty="0"/>
-              <a:t>Find out if it is possible to classify the political sentiment on twitter by multiple comments</a:t>
-            </a:r>
-          </a:p>
-          <a:p>
+              <a:t>for</a:t>
+            </a:r>
             <a:r>
               <a:rPr lang="en-GB" noProof="0" dirty="0"/>
-              <a:t>Experiment if the Big5 Analysis is also possible on </a:t>
-            </a:r>
-            <a:r>
-              <a:rPr lang="en-GB" noProof="0" dirty="0" err="1"/>
-              <a:t>machin</a:t>
+              <a:t> machine</a:t>
             </a:r>
             <a:r>
               <a:rPr lang="en-GB" dirty="0"/>
-              <a:t>e translated data</a:t>
+              <a:t> translated data</a:t>
             </a:r>
           </a:p>
           <a:p>
             <a:r>
               <a:rPr lang="en-GB" dirty="0"/>
-              <a:t>Analyse the Big5 </a:t>
-            </a:r>
-            <a:r>
-              <a:rPr lang="en-GB" dirty="0" err="1"/>
-              <a:t>criterias</a:t>
-            </a:r>
-            <a:r>
-              <a:rPr lang="en-GB" dirty="0"/>
-              <a:t> for every political party.  </a:t>
+              <a:t>Analyse the Big5 personality traits for each political party.  </a:t>
             </a:r>
             <a:endParaRPr lang="en-GB" noProof="0" dirty="0"/>
           </a:p>
@@ -3790,8 +3618,198 @@
 </p:sld>
 </file>
 
+<file path=ppt/slides/slide5.xml><?xml version="1.0" encoding="utf-8"?>
+<p:sld xmlns:a="http://schemas.openxmlformats.org/drawingml/2006/main" xmlns:r="http://schemas.openxmlformats.org/officeDocument/2006/relationships" xmlns:p="http://schemas.openxmlformats.org/presentationml/2006/main">
+  <p:cSld>
+    <p:spTree>
+      <p:nvGrpSpPr>
+        <p:cNvPr id="1" name=""/>
+        <p:cNvGrpSpPr/>
+        <p:nvPr/>
+      </p:nvGrpSpPr>
+      <p:grpSpPr>
+        <a:xfrm>
+          <a:off x="0" y="0"/>
+          <a:ext cx="0" cy="0"/>
+          <a:chOff x="0" y="0"/>
+          <a:chExt cx="0" cy="0"/>
+        </a:xfrm>
+      </p:grpSpPr>
+      <p:sp>
+        <p:nvSpPr>
+          <p:cNvPr id="2" name="Titel 1">
+            <a:extLst>
+              <a:ext uri="{FF2B5EF4-FFF2-40B4-BE49-F238E27FC236}">
+                <a16:creationId xmlns:a16="http://schemas.microsoft.com/office/drawing/2014/main" id="{52CB5AB9-D8B8-4EF4-82E7-FE9311E4F8AE}"/>
+              </a:ext>
+            </a:extLst>
+          </p:cNvPr>
+          <p:cNvSpPr>
+            <a:spLocks noGrp="1"/>
+          </p:cNvSpPr>
+          <p:nvPr>
+            <p:ph type="title"/>
+          </p:nvPr>
+        </p:nvSpPr>
+        <p:spPr/>
+        <p:txBody>
+          <a:bodyPr/>
+          <a:lstStyle/>
+          <a:p>
+            <a:r>
+              <a:rPr lang="en-GB" dirty="0"/>
+              <a:t>Collecting the data from twitter</a:t>
+            </a:r>
+          </a:p>
+        </p:txBody>
+      </p:sp>
+      <p:sp>
+        <p:nvSpPr>
+          <p:cNvPr id="3" name="Inhaltsplatzhalter 2">
+            <a:extLst>
+              <a:ext uri="{FF2B5EF4-FFF2-40B4-BE49-F238E27FC236}">
+                <a16:creationId xmlns:a16="http://schemas.microsoft.com/office/drawing/2014/main" id="{322EC3C3-F6BE-4AA8-A150-7E3B8B69304F}"/>
+              </a:ext>
+            </a:extLst>
+          </p:cNvPr>
+          <p:cNvSpPr>
+            <a:spLocks noGrp="1"/>
+          </p:cNvSpPr>
+          <p:nvPr>
+            <p:ph idx="1"/>
+          </p:nvPr>
+        </p:nvSpPr>
+        <p:spPr/>
+        <p:txBody>
+          <a:bodyPr/>
+          <a:lstStyle/>
+          <a:p>
+            <a:r>
+              <a:rPr lang="en-GB" dirty="0"/>
+              <a:t>We used Selenium to download the data form twitter</a:t>
+            </a:r>
+          </a:p>
+          <a:p>
+            <a:r>
+              <a:rPr lang="en-GB" dirty="0"/>
+              <a:t>Because of the limitation of the several twitter libraries</a:t>
+            </a:r>
+          </a:p>
+          <a:p>
+            <a:r>
+              <a:rPr lang="en-GB" dirty="0"/>
+              <a:t>We used two runs</a:t>
+            </a:r>
+          </a:p>
+          <a:p>
+            <a:r>
+              <a:rPr lang="en-GB" dirty="0"/>
+              <a:t>Getting the right timing for scrolling the page was not trivial  </a:t>
+            </a:r>
+          </a:p>
+        </p:txBody>
+      </p:sp>
+    </p:spTree>
+    <p:extLst>
+      <p:ext uri="{BB962C8B-B14F-4D97-AF65-F5344CB8AC3E}">
+        <p14:creationId xmlns:p14="http://schemas.microsoft.com/office/powerpoint/2010/main" val="2835579703"/>
+      </p:ext>
+    </p:extLst>
+  </p:cSld>
+  <p:clrMapOvr>
+    <a:masterClrMapping/>
+  </p:clrMapOvr>
+</p:sld>
+</file>
+
+<file path=ppt/slides/slide6.xml><?xml version="1.0" encoding="utf-8"?>
+<p:sld xmlns:a="http://schemas.openxmlformats.org/drawingml/2006/main" xmlns:r="http://schemas.openxmlformats.org/officeDocument/2006/relationships" xmlns:p="http://schemas.openxmlformats.org/presentationml/2006/main">
+  <p:cSld>
+    <p:spTree>
+      <p:nvGrpSpPr>
+        <p:cNvPr id="1" name=""/>
+        <p:cNvGrpSpPr/>
+        <p:nvPr/>
+      </p:nvGrpSpPr>
+      <p:grpSpPr>
+        <a:xfrm>
+          <a:off x="0" y="0"/>
+          <a:ext cx="0" cy="0"/>
+          <a:chOff x="0" y="0"/>
+          <a:chExt cx="0" cy="0"/>
+        </a:xfrm>
+      </p:grpSpPr>
+      <p:sp>
+        <p:nvSpPr>
+          <p:cNvPr id="2" name="Titel 1">
+            <a:extLst>
+              <a:ext uri="{FF2B5EF4-FFF2-40B4-BE49-F238E27FC236}">
+                <a16:creationId xmlns:a16="http://schemas.microsoft.com/office/drawing/2014/main" id="{C3277744-7755-4613-8992-67FB0ACCB54E}"/>
+              </a:ext>
+            </a:extLst>
+          </p:cNvPr>
+          <p:cNvSpPr>
+            <a:spLocks noGrp="1"/>
+          </p:cNvSpPr>
+          <p:nvPr>
+            <p:ph type="title"/>
+          </p:nvPr>
+        </p:nvSpPr>
+        <p:spPr/>
+        <p:txBody>
+          <a:bodyPr/>
+          <a:lstStyle/>
+          <a:p>
+            <a:r>
+              <a:rPr lang="en-GB" dirty="0"/>
+              <a:t>Building the party classifier</a:t>
+            </a:r>
+          </a:p>
+        </p:txBody>
+      </p:sp>
+      <p:sp>
+        <p:nvSpPr>
+          <p:cNvPr id="3" name="Inhaltsplatzhalter 2">
+            <a:extLst>
+              <a:ext uri="{FF2B5EF4-FFF2-40B4-BE49-F238E27FC236}">
+                <a16:creationId xmlns:a16="http://schemas.microsoft.com/office/drawing/2014/main" id="{C28E9968-CB98-47FD-A7E1-9D1224E34991}"/>
+              </a:ext>
+            </a:extLst>
+          </p:cNvPr>
+          <p:cNvSpPr>
+            <a:spLocks noGrp="1"/>
+          </p:cNvSpPr>
+          <p:nvPr>
+            <p:ph idx="1"/>
+          </p:nvPr>
+        </p:nvSpPr>
+        <p:spPr/>
+        <p:txBody>
+          <a:bodyPr/>
+          <a:lstStyle/>
+          <a:p>
+            <a:r>
+              <a:rPr lang="en-GB" dirty="0"/>
+              <a:t>Main idea</a:t>
+            </a:r>
+          </a:p>
+        </p:txBody>
+      </p:sp>
+    </p:spTree>
+    <p:extLst>
+      <p:ext uri="{BB962C8B-B14F-4D97-AF65-F5344CB8AC3E}">
+        <p14:creationId xmlns:p14="http://schemas.microsoft.com/office/powerpoint/2010/main" val="1151154659"/>
+      </p:ext>
+    </p:extLst>
+  </p:cSld>
+  <p:clrMapOvr>
+    <a:masterClrMapping/>
+  </p:clrMapOvr>
+</p:sld>
+</file>
+
 <file path=ppt/theme/theme1.xml><?xml version="1.0" encoding="utf-8"?>
-<a:theme xmlns:a="http://schemas.openxmlformats.org/drawingml/2006/main" name="Office">
+<a:theme xmlns:a="http://schemas.openxmlformats.org/drawingml/2006/main" name="Office Theme">
   <a:themeElements>
     <a:clrScheme name="Office">
       <a:dk1>
@@ -3807,22 +3825,22 @@
         <a:srgbClr val="E7E6E6"/>
       </a:lt2>
       <a:accent1>
-        <a:srgbClr val="4472C4"/>
+        <a:srgbClr val="1D9A78"/>
       </a:accent1>
       <a:accent2>
-        <a:srgbClr val="ED7D31"/>
+        <a:srgbClr val="8BC145"/>
       </a:accent2>
       <a:accent3>
-        <a:srgbClr val="A5A5A5"/>
+        <a:srgbClr val="36AFCE"/>
       </a:accent3>
       <a:accent4>
-        <a:srgbClr val="FFC000"/>
+        <a:srgbClr val="1D6FA9"/>
       </a:accent4>
       <a:accent5>
-        <a:srgbClr val="5B9BD5"/>
+        <a:srgbClr val="B74919"/>
       </a:accent5>
       <a:accent6>
-        <a:srgbClr val="70AD47"/>
+        <a:srgbClr val="F19D19"/>
       </a:accent6>
       <a:hlink>
         <a:srgbClr val="0563C1"/>
@@ -3866,23 +3884,6 @@
         <a:font script="Viet" typeface="Times New Roman"/>
         <a:font script="Uigh" typeface="Microsoft Uighur"/>
         <a:font script="Geor" typeface="Sylfaen"/>
-        <a:font script="Armn" typeface="Arial"/>
-        <a:font script="Bugi" typeface="Leelawadee UI"/>
-        <a:font script="Bopo" typeface="Microsoft JhengHei"/>
-        <a:font script="Java" typeface="Javanese Text"/>
-        <a:font script="Lisu" typeface="Segoe UI"/>
-        <a:font script="Mymr" typeface="Myanmar Text"/>
-        <a:font script="Nkoo" typeface="Ebrima"/>
-        <a:font script="Olck" typeface="Nirmala UI"/>
-        <a:font script="Osma" typeface="Ebrima"/>
-        <a:font script="Phag" typeface="Phagspa"/>
-        <a:font script="Syrn" typeface="Estrangelo Edessa"/>
-        <a:font script="Syrj" typeface="Estrangelo Edessa"/>
-        <a:font script="Syre" typeface="Estrangelo Edessa"/>
-        <a:font script="Sora" typeface="Nirmala UI"/>
-        <a:font script="Tale" typeface="Microsoft Tai Le"/>
-        <a:font script="Talu" typeface="Microsoft New Tai Lue"/>
-        <a:font script="Tfng" typeface="Ebrima"/>
       </a:majorFont>
       <a:minorFont>
         <a:latin typeface="Calibri" panose="020F0502020204030204"/>
@@ -3918,23 +3919,6 @@
         <a:font script="Viet" typeface="Arial"/>
         <a:font script="Uigh" typeface="Microsoft Uighur"/>
         <a:font script="Geor" typeface="Sylfaen"/>
-        <a:font script="Armn" typeface="Arial"/>
-        <a:font script="Bugi" typeface="Leelawadee UI"/>
-        <a:font script="Bopo" typeface="Microsoft JhengHei"/>
-        <a:font script="Java" typeface="Javanese Text"/>
-        <a:font script="Lisu" typeface="Segoe UI"/>
-        <a:font script="Mymr" typeface="Myanmar Text"/>
-        <a:font script="Nkoo" typeface="Ebrima"/>
-        <a:font script="Olck" typeface="Nirmala UI"/>
-        <a:font script="Osma" typeface="Ebrima"/>
-        <a:font script="Phag" typeface="Phagspa"/>
-        <a:font script="Syrn" typeface="Estrangelo Edessa"/>
-        <a:font script="Syrj" typeface="Estrangelo Edessa"/>
-        <a:font script="Syre" typeface="Estrangelo Edessa"/>
-        <a:font script="Sora" typeface="Nirmala UI"/>
-        <a:font script="Tale" typeface="Microsoft Tai Le"/>
-        <a:font script="Talu" typeface="Microsoft New Tai Lue"/>
-        <a:font script="Tfng" typeface="Ebrima"/>
       </a:minorFont>
     </a:fontScheme>
     <a:fmtScheme name="Office">
@@ -4079,7 +4063,7 @@
   <a:extraClrSchemeLst/>
   <a:extLst>
     <a:ext uri="{05A4C25C-085E-4340-85A3-A5531E510DB2}">
-      <thm15:themeFamily xmlns:thm15="http://schemas.microsoft.com/office/thememl/2012/main" name="Office Theme" id="{62F939B6-93AF-4DB8-9C6B-D6C7DFDC589F}" vid="{4A3C46E8-61CC-4603-A589-7422A47A8E4A}"/>
+      <thm15:themeFamily xmlns:thm15="http://schemas.microsoft.com/office/thememl/2012/main" name="Office Theme" id="{62F939B6-93AF-4DB8-9C6B-D6C7DFDC589F}" vid="{AE6F2518-B084-4896-AF52-66CC2144AA26}"/>
     </a:ext>
   </a:extLst>
 </a:theme>

</xml_diff>